<commit_message>
Update Seaweed Value Chain Development.pptx
</commit_message>
<xml_diff>
--- a/Seaweed Value Chain Development.pptx
+++ b/Seaweed Value Chain Development.pptx
@@ -6,6 +6,7 @@
   </p:sldMasterIdLst>
   <p:sldIdLst>
     <p:sldId id="339" r:id="rId2"/>
+    <p:sldId id="301" r:id="rId3"/>
   </p:sldIdLst>
   <p:sldSz cx="12192000" cy="6858000"/>
   <p:notesSz cx="6858000" cy="9144000"/>
@@ -104,7 +105,1554 @@
       </a:defRPr>
     </a:lvl9pPr>
   </p:defaultTextStyle>
+  <p:extLst>
+    <p:ext uri="{EFAFB233-063F-42B5-8137-9DF3F51BA10A}">
+      <p15:sldGuideLst xmlns:p15="http://schemas.microsoft.com/office/powerpoint/2012/main"/>
+    </p:ext>
+  </p:extLst>
 </p:presentation>
+</file>
+
+<file path=ppt/charts/chart1.xml><?xml version="1.0" encoding="utf-8"?>
+<c:chartSpace xmlns:c="http://schemas.openxmlformats.org/drawingml/2006/chart" xmlns:a="http://schemas.openxmlformats.org/drawingml/2006/main" xmlns:r="http://schemas.openxmlformats.org/officeDocument/2006/relationships" xmlns:c16r2="http://schemas.microsoft.com/office/drawing/2015/06/chart">
+  <c:date1904 val="0"/>
+  <c:lang val="en-US"/>
+  <c:roundedCorners val="0"/>
+  <mc:AlternateContent xmlns:mc="http://schemas.openxmlformats.org/markup-compatibility/2006">
+    <mc:Choice xmlns:c14="http://schemas.microsoft.com/office/drawing/2007/8/2/chart" Requires="c14">
+      <c14:style val="102"/>
+    </mc:Choice>
+    <mc:Fallback>
+      <c:style val="2"/>
+    </mc:Fallback>
+  </mc:AlternateContent>
+  <c:chart>
+    <c:autoTitleDeleted val="1"/>
+    <c:plotArea>
+      <c:layout/>
+      <c:radarChart>
+        <c:radarStyle val="marker"/>
+        <c:varyColors val="0"/>
+        <c:ser>
+          <c:idx val="0"/>
+          <c:order val="0"/>
+          <c:tx>
+            <c:strRef>
+              <c:f>Sheet1!$B$1</c:f>
+              <c:strCache>
+                <c:ptCount val="1"/>
+                <c:pt idx="0">
+                  <c:v>Website</c:v>
+                </c:pt>
+              </c:strCache>
+            </c:strRef>
+          </c:tx>
+          <c:spPr>
+            <a:ln w="57150" cap="rnd">
+              <a:solidFill>
+                <a:srgbClr val="25AAE1"/>
+              </a:solidFill>
+              <a:round/>
+            </a:ln>
+            <a:effectLst/>
+          </c:spPr>
+          <c:marker>
+            <c:symbol val="none"/>
+          </c:marker>
+          <c:cat>
+            <c:strRef>
+              <c:f>Sheet1!$A$2:$A$7</c:f>
+              <c:strCache>
+                <c:ptCount val="6"/>
+                <c:pt idx="0">
+                  <c:v>Unprofessional</c:v>
+                </c:pt>
+                <c:pt idx="1">
+                  <c:v>Unappealing</c:v>
+                </c:pt>
+                <c:pt idx="2">
+                  <c:v>Vague</c:v>
+                </c:pt>
+                <c:pt idx="3">
+                  <c:v>Complicated</c:v>
+                </c:pt>
+                <c:pt idx="4">
+                  <c:v>Illegimate</c:v>
+                </c:pt>
+                <c:pt idx="5">
+                  <c:v>Inconsistent</c:v>
+                </c:pt>
+              </c:strCache>
+            </c:strRef>
+          </c:cat>
+          <c:val>
+            <c:numRef>
+              <c:f>Sheet1!$B$2:$B$7</c:f>
+              <c:numCache>
+                <c:formatCode>General</c:formatCode>
+                <c:ptCount val="6"/>
+                <c:pt idx="0">
+                  <c:v>6</c:v>
+                </c:pt>
+                <c:pt idx="1">
+                  <c:v>5</c:v>
+                </c:pt>
+                <c:pt idx="2">
+                  <c:v>8</c:v>
+                </c:pt>
+                <c:pt idx="3">
+                  <c:v>7</c:v>
+                </c:pt>
+                <c:pt idx="4">
+                  <c:v>3</c:v>
+                </c:pt>
+                <c:pt idx="5">
+                  <c:v>5</c:v>
+                </c:pt>
+              </c:numCache>
+            </c:numRef>
+          </c:val>
+          <c:extLst>
+            <c:ext xmlns:c16="http://schemas.microsoft.com/office/drawing/2014/chart" uri="{C3380CC4-5D6E-409C-BE32-E72D297353CC}">
+              <c16:uniqueId val="{00000000-1B01-4CBF-BBC1-2A47E7C688E5}"/>
+            </c:ext>
+          </c:extLst>
+        </c:ser>
+        <c:dLbls>
+          <c:showLegendKey val="0"/>
+          <c:showVal val="0"/>
+          <c:showCatName val="0"/>
+          <c:showSerName val="0"/>
+          <c:showPercent val="0"/>
+          <c:showBubbleSize val="0"/>
+        </c:dLbls>
+        <c:axId val="-2086711504"/>
+        <c:axId val="-2084934672"/>
+      </c:radarChart>
+      <c:catAx>
+        <c:axId val="-2086711504"/>
+        <c:scaling>
+          <c:orientation val="minMax"/>
+        </c:scaling>
+        <c:delete val="0"/>
+        <c:axPos val="b"/>
+        <c:numFmt formatCode="General" sourceLinked="1"/>
+        <c:majorTickMark val="none"/>
+        <c:minorTickMark val="none"/>
+        <c:tickLblPos val="nextTo"/>
+        <c:spPr>
+          <a:noFill/>
+          <a:ln w="9525" cap="flat" cmpd="sng" algn="ctr">
+            <a:solidFill>
+              <a:schemeClr val="tx1">
+                <a:lumMod val="15000"/>
+                <a:lumOff val="85000"/>
+              </a:schemeClr>
+            </a:solidFill>
+            <a:round/>
+          </a:ln>
+          <a:effectLst/>
+        </c:spPr>
+        <c:txPr>
+          <a:bodyPr rot="-60000000" spcFirstLastPara="1" vertOverflow="ellipsis" vert="horz" wrap="square" anchor="ctr" anchorCtr="1"/>
+          <a:lstStyle/>
+          <a:p>
+            <a:pPr>
+              <a:defRPr sz="900" b="0" i="0" u="none" strike="noStrike" kern="1200" baseline="0">
+                <a:solidFill>
+                  <a:srgbClr val="5B5A5D"/>
+                </a:solidFill>
+                <a:latin typeface="Garamond" panose="02020404030301010803" pitchFamily="18" charset="0"/>
+                <a:ea typeface="+mn-ea"/>
+                <a:cs typeface="+mn-cs"/>
+              </a:defRPr>
+            </a:pPr>
+            <a:endParaRPr lang="en-US"/>
+          </a:p>
+        </c:txPr>
+        <c:crossAx val="-2084934672"/>
+        <c:crosses val="autoZero"/>
+        <c:auto val="1"/>
+        <c:lblAlgn val="ctr"/>
+        <c:lblOffset val="100"/>
+        <c:noMultiLvlLbl val="0"/>
+      </c:catAx>
+      <c:valAx>
+        <c:axId val="-2084934672"/>
+        <c:scaling>
+          <c:orientation val="minMax"/>
+        </c:scaling>
+        <c:delete val="1"/>
+        <c:axPos val="l"/>
+        <c:majorGridlines>
+          <c:spPr>
+            <a:ln w="9525" cap="flat" cmpd="sng" algn="ctr">
+              <a:solidFill>
+                <a:srgbClr val="A7A9AD"/>
+              </a:solidFill>
+              <a:round/>
+            </a:ln>
+            <a:effectLst/>
+          </c:spPr>
+        </c:majorGridlines>
+        <c:numFmt formatCode="General" sourceLinked="1"/>
+        <c:majorTickMark val="none"/>
+        <c:minorTickMark val="none"/>
+        <c:tickLblPos val="nextTo"/>
+        <c:crossAx val="-2086711504"/>
+        <c:crosses val="autoZero"/>
+        <c:crossBetween val="between"/>
+      </c:valAx>
+      <c:spPr>
+        <a:noFill/>
+        <a:ln>
+          <a:noFill/>
+        </a:ln>
+        <a:effectLst/>
+      </c:spPr>
+    </c:plotArea>
+    <c:plotVisOnly val="1"/>
+    <c:dispBlanksAs val="gap"/>
+    <c:showDLblsOverMax val="0"/>
+  </c:chart>
+  <c:spPr>
+    <a:noFill/>
+    <a:ln>
+      <a:noFill/>
+    </a:ln>
+    <a:effectLst/>
+  </c:spPr>
+  <c:txPr>
+    <a:bodyPr/>
+    <a:lstStyle/>
+    <a:p>
+      <a:pPr>
+        <a:defRPr/>
+      </a:pPr>
+      <a:endParaRPr lang="en-US"/>
+    </a:p>
+  </c:txPr>
+  <c:externalData r:id="rId3">
+    <c:autoUpdate val="0"/>
+  </c:externalData>
+</c:chartSpace>
+</file>
+
+<file path=ppt/charts/chart2.xml><?xml version="1.0" encoding="utf-8"?>
+<c:chartSpace xmlns:c="http://schemas.openxmlformats.org/drawingml/2006/chart" xmlns:a="http://schemas.openxmlformats.org/drawingml/2006/main" xmlns:r="http://schemas.openxmlformats.org/officeDocument/2006/relationships" xmlns:c16r2="http://schemas.microsoft.com/office/drawing/2015/06/chart">
+  <c:date1904 val="0"/>
+  <c:lang val="en-US"/>
+  <c:roundedCorners val="0"/>
+  <mc:AlternateContent xmlns:mc="http://schemas.openxmlformats.org/markup-compatibility/2006">
+    <mc:Choice xmlns:c14="http://schemas.microsoft.com/office/drawing/2007/8/2/chart" Requires="c14">
+      <c14:style val="102"/>
+    </mc:Choice>
+    <mc:Fallback>
+      <c:style val="2"/>
+    </mc:Fallback>
+  </mc:AlternateContent>
+  <c:chart>
+    <c:autoTitleDeleted val="1"/>
+    <c:plotArea>
+      <c:layout/>
+      <c:radarChart>
+        <c:radarStyle val="marker"/>
+        <c:varyColors val="0"/>
+        <c:ser>
+          <c:idx val="0"/>
+          <c:order val="0"/>
+          <c:tx>
+            <c:strRef>
+              <c:f>Sheet1!$F$1</c:f>
+              <c:strCache>
+                <c:ptCount val="1"/>
+                <c:pt idx="0">
+                  <c:v>App</c:v>
+                </c:pt>
+              </c:strCache>
+            </c:strRef>
+          </c:tx>
+          <c:spPr>
+            <a:ln w="57150" cap="rnd">
+              <a:solidFill>
+                <a:srgbClr val="F86C5E"/>
+              </a:solidFill>
+              <a:round/>
+            </a:ln>
+            <a:effectLst/>
+          </c:spPr>
+          <c:marker>
+            <c:symbol val="none"/>
+          </c:marker>
+          <c:cat>
+            <c:strRef>
+              <c:f>Sheet1!$E$2:$E$7</c:f>
+              <c:strCache>
+                <c:ptCount val="6"/>
+                <c:pt idx="0">
+                  <c:v>Time-extensive</c:v>
+                </c:pt>
+                <c:pt idx="1">
+                  <c:v>Long</c:v>
+                </c:pt>
+                <c:pt idx="2">
+                  <c:v>Difficult</c:v>
+                </c:pt>
+                <c:pt idx="3">
+                  <c:v>Glitchy</c:v>
+                </c:pt>
+                <c:pt idx="4">
+                  <c:v>Annoying</c:v>
+                </c:pt>
+                <c:pt idx="5">
+                  <c:v>Unclear</c:v>
+                </c:pt>
+              </c:strCache>
+            </c:strRef>
+          </c:cat>
+          <c:val>
+            <c:numRef>
+              <c:f>Sheet1!$F$2:$F$7</c:f>
+              <c:numCache>
+                <c:formatCode>General</c:formatCode>
+                <c:ptCount val="6"/>
+                <c:pt idx="0">
+                  <c:v>4</c:v>
+                </c:pt>
+                <c:pt idx="1">
+                  <c:v>8</c:v>
+                </c:pt>
+                <c:pt idx="2">
+                  <c:v>3</c:v>
+                </c:pt>
+                <c:pt idx="3">
+                  <c:v>6</c:v>
+                </c:pt>
+                <c:pt idx="4">
+                  <c:v>8</c:v>
+                </c:pt>
+                <c:pt idx="5">
+                  <c:v>6</c:v>
+                </c:pt>
+              </c:numCache>
+            </c:numRef>
+          </c:val>
+          <c:extLst>
+            <c:ext xmlns:c16="http://schemas.microsoft.com/office/drawing/2014/chart" uri="{C3380CC4-5D6E-409C-BE32-E72D297353CC}">
+              <c16:uniqueId val="{00000000-2B1C-403A-8324-1D7675CC8834}"/>
+            </c:ext>
+          </c:extLst>
+        </c:ser>
+        <c:dLbls>
+          <c:showLegendKey val="0"/>
+          <c:showVal val="0"/>
+          <c:showCatName val="0"/>
+          <c:showSerName val="0"/>
+          <c:showPercent val="0"/>
+          <c:showBubbleSize val="0"/>
+        </c:dLbls>
+        <c:axId val="-2086701008"/>
+        <c:axId val="-2087264592"/>
+      </c:radarChart>
+      <c:catAx>
+        <c:axId val="-2086701008"/>
+        <c:scaling>
+          <c:orientation val="minMax"/>
+        </c:scaling>
+        <c:delete val="0"/>
+        <c:axPos val="b"/>
+        <c:numFmt formatCode="General" sourceLinked="1"/>
+        <c:majorTickMark val="none"/>
+        <c:minorTickMark val="none"/>
+        <c:tickLblPos val="nextTo"/>
+        <c:spPr>
+          <a:noFill/>
+          <a:ln w="9525" cap="flat" cmpd="sng" algn="ctr">
+            <a:solidFill>
+              <a:schemeClr val="tx1">
+                <a:lumMod val="15000"/>
+                <a:lumOff val="85000"/>
+              </a:schemeClr>
+            </a:solidFill>
+            <a:round/>
+          </a:ln>
+          <a:effectLst/>
+        </c:spPr>
+        <c:txPr>
+          <a:bodyPr rot="-60000000" spcFirstLastPara="1" vertOverflow="ellipsis" vert="horz" wrap="square" anchor="ctr" anchorCtr="1"/>
+          <a:lstStyle/>
+          <a:p>
+            <a:pPr>
+              <a:defRPr sz="900" b="0" i="0" u="none" strike="noStrike" kern="1200" baseline="0">
+                <a:solidFill>
+                  <a:srgbClr val="5B5A5D"/>
+                </a:solidFill>
+                <a:latin typeface="Garamond" panose="02020404030301010803" pitchFamily="18" charset="0"/>
+                <a:ea typeface="+mn-ea"/>
+                <a:cs typeface="+mn-cs"/>
+              </a:defRPr>
+            </a:pPr>
+            <a:endParaRPr lang="en-US"/>
+          </a:p>
+        </c:txPr>
+        <c:crossAx val="-2087264592"/>
+        <c:crosses val="autoZero"/>
+        <c:auto val="1"/>
+        <c:lblAlgn val="ctr"/>
+        <c:lblOffset val="100"/>
+        <c:noMultiLvlLbl val="0"/>
+      </c:catAx>
+      <c:valAx>
+        <c:axId val="-2087264592"/>
+        <c:scaling>
+          <c:orientation val="minMax"/>
+        </c:scaling>
+        <c:delete val="1"/>
+        <c:axPos val="l"/>
+        <c:majorGridlines>
+          <c:spPr>
+            <a:ln w="9525" cap="flat" cmpd="sng" algn="ctr">
+              <a:solidFill>
+                <a:srgbClr val="A7A9AD"/>
+              </a:solidFill>
+              <a:round/>
+            </a:ln>
+            <a:effectLst/>
+          </c:spPr>
+        </c:majorGridlines>
+        <c:numFmt formatCode="General" sourceLinked="1"/>
+        <c:majorTickMark val="none"/>
+        <c:minorTickMark val="none"/>
+        <c:tickLblPos val="nextTo"/>
+        <c:crossAx val="-2086701008"/>
+        <c:crosses val="autoZero"/>
+        <c:crossBetween val="between"/>
+      </c:valAx>
+      <c:spPr>
+        <a:noFill/>
+        <a:ln>
+          <a:noFill/>
+        </a:ln>
+        <a:effectLst/>
+      </c:spPr>
+    </c:plotArea>
+    <c:plotVisOnly val="1"/>
+    <c:dispBlanksAs val="gap"/>
+    <c:showDLblsOverMax val="0"/>
+  </c:chart>
+  <c:spPr>
+    <a:noFill/>
+    <a:ln>
+      <a:noFill/>
+    </a:ln>
+    <a:effectLst/>
+  </c:spPr>
+  <c:txPr>
+    <a:bodyPr/>
+    <a:lstStyle/>
+    <a:p>
+      <a:pPr>
+        <a:defRPr>
+          <a:latin typeface="Baskerville Old Face" panose="02020602080505020303" pitchFamily="18" charset="0"/>
+        </a:defRPr>
+      </a:pPr>
+      <a:endParaRPr lang="en-US"/>
+    </a:p>
+  </c:txPr>
+  <c:externalData r:id="rId3">
+    <c:autoUpdate val="0"/>
+  </c:externalData>
+</c:chartSpace>
+</file>
+
+<file path=ppt/charts/colors1.xml><?xml version="1.0" encoding="utf-8"?>
+<cs:colorStyle xmlns:cs="http://schemas.microsoft.com/office/drawing/2012/chartStyle" xmlns:a="http://schemas.openxmlformats.org/drawingml/2006/main" meth="cycle" id="10">
+  <a:schemeClr val="accent1"/>
+  <a:schemeClr val="accent2"/>
+  <a:schemeClr val="accent3"/>
+  <a:schemeClr val="accent4"/>
+  <a:schemeClr val="accent5"/>
+  <a:schemeClr val="accent6"/>
+  <cs:variation/>
+  <cs:variation>
+    <a:lumMod val="60000"/>
+  </cs:variation>
+  <cs:variation>
+    <a:lumMod val="80000"/>
+    <a:lumOff val="20000"/>
+  </cs:variation>
+  <cs:variation>
+    <a:lumMod val="80000"/>
+  </cs:variation>
+  <cs:variation>
+    <a:lumMod val="60000"/>
+    <a:lumOff val="40000"/>
+  </cs:variation>
+  <cs:variation>
+    <a:lumMod val="50000"/>
+  </cs:variation>
+  <cs:variation>
+    <a:lumMod val="70000"/>
+    <a:lumOff val="30000"/>
+  </cs:variation>
+  <cs:variation>
+    <a:lumMod val="70000"/>
+  </cs:variation>
+  <cs:variation>
+    <a:lumMod val="50000"/>
+    <a:lumOff val="50000"/>
+  </cs:variation>
+</cs:colorStyle>
+</file>
+
+<file path=ppt/charts/colors2.xml><?xml version="1.0" encoding="utf-8"?>
+<cs:colorStyle xmlns:cs="http://schemas.microsoft.com/office/drawing/2012/chartStyle" xmlns:a="http://schemas.openxmlformats.org/drawingml/2006/main" meth="cycle" id="10">
+  <a:schemeClr val="accent1"/>
+  <a:schemeClr val="accent2"/>
+  <a:schemeClr val="accent3"/>
+  <a:schemeClr val="accent4"/>
+  <a:schemeClr val="accent5"/>
+  <a:schemeClr val="accent6"/>
+  <cs:variation/>
+  <cs:variation>
+    <a:lumMod val="60000"/>
+  </cs:variation>
+  <cs:variation>
+    <a:lumMod val="80000"/>
+    <a:lumOff val="20000"/>
+  </cs:variation>
+  <cs:variation>
+    <a:lumMod val="80000"/>
+  </cs:variation>
+  <cs:variation>
+    <a:lumMod val="60000"/>
+    <a:lumOff val="40000"/>
+  </cs:variation>
+  <cs:variation>
+    <a:lumMod val="50000"/>
+  </cs:variation>
+  <cs:variation>
+    <a:lumMod val="70000"/>
+    <a:lumOff val="30000"/>
+  </cs:variation>
+  <cs:variation>
+    <a:lumMod val="70000"/>
+  </cs:variation>
+  <cs:variation>
+    <a:lumMod val="50000"/>
+    <a:lumOff val="50000"/>
+  </cs:variation>
+</cs:colorStyle>
+</file>
+
+<file path=ppt/charts/style1.xml><?xml version="1.0" encoding="utf-8"?>
+<cs:chartStyle xmlns:cs="http://schemas.microsoft.com/office/drawing/2012/chartStyle" xmlns:a="http://schemas.openxmlformats.org/drawingml/2006/main" id="317">
+  <cs:axisTitle>
+    <cs:lnRef idx="0"/>
+    <cs:fillRef idx="0"/>
+    <cs:effectRef idx="0"/>
+    <cs:fontRef idx="minor">
+      <a:schemeClr val="tx1">
+        <a:lumMod val="65000"/>
+        <a:lumOff val="35000"/>
+      </a:schemeClr>
+    </cs:fontRef>
+    <cs:defRPr sz="1000" kern="1200"/>
+  </cs:axisTitle>
+  <cs:categoryAxis>
+    <cs:lnRef idx="0"/>
+    <cs:fillRef idx="0"/>
+    <cs:effectRef idx="0"/>
+    <cs:fontRef idx="minor">
+      <a:schemeClr val="tx1">
+        <a:lumMod val="65000"/>
+        <a:lumOff val="35000"/>
+      </a:schemeClr>
+    </cs:fontRef>
+    <cs:spPr>
+      <a:ln w="9525" cap="flat" cmpd="sng" algn="ctr">
+        <a:solidFill>
+          <a:schemeClr val="tx1">
+            <a:lumMod val="15000"/>
+            <a:lumOff val="85000"/>
+          </a:schemeClr>
+        </a:solidFill>
+        <a:round/>
+      </a:ln>
+    </cs:spPr>
+    <cs:defRPr sz="900" kern="1200"/>
+  </cs:categoryAxis>
+  <cs:chartArea mods="allowNoFillOverride allowNoLineOverride">
+    <cs:lnRef idx="0"/>
+    <cs:fillRef idx="0"/>
+    <cs:effectRef idx="0"/>
+    <cs:fontRef idx="minor">
+      <a:schemeClr val="tx1"/>
+    </cs:fontRef>
+    <cs:spPr>
+      <a:solidFill>
+        <a:schemeClr val="bg1"/>
+      </a:solidFill>
+      <a:ln w="9525" cap="flat" cmpd="sng" algn="ctr">
+        <a:solidFill>
+          <a:schemeClr val="tx1">
+            <a:lumMod val="15000"/>
+            <a:lumOff val="85000"/>
+          </a:schemeClr>
+        </a:solidFill>
+        <a:round/>
+      </a:ln>
+    </cs:spPr>
+    <cs:defRPr sz="1000" kern="1200"/>
+  </cs:chartArea>
+  <cs:dataLabel>
+    <cs:lnRef idx="0"/>
+    <cs:fillRef idx="0"/>
+    <cs:effectRef idx="0"/>
+    <cs:fontRef idx="minor">
+      <a:schemeClr val="tx1">
+        <a:lumMod val="75000"/>
+        <a:lumOff val="25000"/>
+      </a:schemeClr>
+    </cs:fontRef>
+    <cs:defRPr sz="900" kern="1200"/>
+  </cs:dataLabel>
+  <cs:dataLabelCallout>
+    <cs:lnRef idx="0"/>
+    <cs:fillRef idx="0"/>
+    <cs:effectRef idx="0"/>
+    <cs:fontRef idx="minor">
+      <a:schemeClr val="dk1">
+        <a:lumMod val="65000"/>
+        <a:lumOff val="35000"/>
+      </a:schemeClr>
+    </cs:fontRef>
+    <cs:spPr>
+      <a:solidFill>
+        <a:schemeClr val="lt1"/>
+      </a:solidFill>
+      <a:ln>
+        <a:solidFill>
+          <a:schemeClr val="dk1">
+            <a:lumMod val="25000"/>
+            <a:lumOff val="75000"/>
+          </a:schemeClr>
+        </a:solidFill>
+      </a:ln>
+    </cs:spPr>
+    <cs:defRPr sz="900" kern="1200"/>
+    <cs:bodyPr rot="0" spcFirstLastPara="1" vertOverflow="clip" horzOverflow="clip" vert="horz" wrap="square" lIns="36576" tIns="18288" rIns="36576" bIns="18288" anchor="ctr" anchorCtr="1">
+      <a:spAutoFit/>
+    </cs:bodyPr>
+  </cs:dataLabelCallout>
+  <cs:dataPoint>
+    <cs:lnRef idx="0"/>
+    <cs:fillRef idx="1">
+      <cs:styleClr val="auto"/>
+    </cs:fillRef>
+    <cs:effectRef idx="0"/>
+    <cs:fontRef idx="minor">
+      <a:schemeClr val="tx1"/>
+    </cs:fontRef>
+  </cs:dataPoint>
+  <cs:dataPoint3D>
+    <cs:lnRef idx="0"/>
+    <cs:fillRef idx="1">
+      <cs:styleClr val="auto"/>
+    </cs:fillRef>
+    <cs:effectRef idx="0"/>
+    <cs:fontRef idx="minor">
+      <a:schemeClr val="tx1"/>
+    </cs:fontRef>
+  </cs:dataPoint3D>
+  <cs:dataPointLine>
+    <cs:lnRef idx="0">
+      <cs:styleClr val="auto"/>
+    </cs:lnRef>
+    <cs:fillRef idx="1"/>
+    <cs:effectRef idx="0"/>
+    <cs:fontRef idx="minor">
+      <a:schemeClr val="tx1"/>
+    </cs:fontRef>
+    <cs:spPr>
+      <a:ln w="28575" cap="rnd">
+        <a:solidFill>
+          <a:schemeClr val="phClr"/>
+        </a:solidFill>
+        <a:round/>
+      </a:ln>
+    </cs:spPr>
+  </cs:dataPointLine>
+  <cs:dataPointMarker>
+    <cs:lnRef idx="0">
+      <cs:styleClr val="auto"/>
+    </cs:lnRef>
+    <cs:fillRef idx="1">
+      <cs:styleClr val="auto"/>
+    </cs:fillRef>
+    <cs:effectRef idx="0"/>
+    <cs:fontRef idx="minor">
+      <a:schemeClr val="tx1"/>
+    </cs:fontRef>
+    <cs:spPr>
+      <a:ln w="9525">
+        <a:solidFill>
+          <a:schemeClr val="phClr"/>
+        </a:solidFill>
+      </a:ln>
+    </cs:spPr>
+  </cs:dataPointMarker>
+  <cs:dataPointMarkerLayout symbol="circle" size="5"/>
+  <cs:dataPointWireframe>
+    <cs:lnRef idx="0">
+      <cs:styleClr val="auto"/>
+    </cs:lnRef>
+    <cs:fillRef idx="1"/>
+    <cs:effectRef idx="0"/>
+    <cs:fontRef idx="minor">
+      <a:schemeClr val="tx1"/>
+    </cs:fontRef>
+    <cs:spPr>
+      <a:ln w="9525" cap="rnd">
+        <a:solidFill>
+          <a:schemeClr val="phClr"/>
+        </a:solidFill>
+        <a:round/>
+      </a:ln>
+    </cs:spPr>
+  </cs:dataPointWireframe>
+  <cs:dataTable>
+    <cs:lnRef idx="0"/>
+    <cs:fillRef idx="0"/>
+    <cs:effectRef idx="0"/>
+    <cs:fontRef idx="minor">
+      <a:schemeClr val="tx1">
+        <a:lumMod val="65000"/>
+        <a:lumOff val="35000"/>
+      </a:schemeClr>
+    </cs:fontRef>
+    <cs:spPr>
+      <a:noFill/>
+      <a:ln w="9525" cap="flat" cmpd="sng" algn="ctr">
+        <a:solidFill>
+          <a:schemeClr val="tx1">
+            <a:lumMod val="15000"/>
+            <a:lumOff val="85000"/>
+          </a:schemeClr>
+        </a:solidFill>
+        <a:round/>
+      </a:ln>
+    </cs:spPr>
+    <cs:defRPr sz="900" kern="1200"/>
+  </cs:dataTable>
+  <cs:downBar>
+    <cs:lnRef idx="0"/>
+    <cs:fillRef idx="0"/>
+    <cs:effectRef idx="0"/>
+    <cs:fontRef idx="minor">
+      <a:schemeClr val="tx1"/>
+    </cs:fontRef>
+    <cs:spPr>
+      <a:solidFill>
+        <a:schemeClr val="dk1">
+          <a:lumMod val="75000"/>
+          <a:lumOff val="25000"/>
+        </a:schemeClr>
+      </a:solidFill>
+      <a:ln w="9525" cap="flat" cmpd="sng" algn="ctr">
+        <a:solidFill>
+          <a:schemeClr val="tx1">
+            <a:lumMod val="65000"/>
+            <a:lumOff val="35000"/>
+          </a:schemeClr>
+        </a:solidFill>
+        <a:round/>
+      </a:ln>
+    </cs:spPr>
+  </cs:downBar>
+  <cs:dropLine>
+    <cs:lnRef idx="0"/>
+    <cs:fillRef idx="0"/>
+    <cs:effectRef idx="0"/>
+    <cs:fontRef idx="minor">
+      <a:schemeClr val="tx1"/>
+    </cs:fontRef>
+    <cs:spPr>
+      <a:ln w="9525" cap="flat" cmpd="sng" algn="ctr">
+        <a:solidFill>
+          <a:schemeClr val="tx1">
+            <a:lumMod val="35000"/>
+            <a:lumOff val="65000"/>
+          </a:schemeClr>
+        </a:solidFill>
+        <a:round/>
+      </a:ln>
+    </cs:spPr>
+  </cs:dropLine>
+  <cs:errorBar>
+    <cs:lnRef idx="0"/>
+    <cs:fillRef idx="0"/>
+    <cs:effectRef idx="0"/>
+    <cs:fontRef idx="minor">
+      <a:schemeClr val="tx1"/>
+    </cs:fontRef>
+    <cs:spPr>
+      <a:ln w="9525" cap="flat" cmpd="sng" algn="ctr">
+        <a:solidFill>
+          <a:schemeClr val="tx1">
+            <a:lumMod val="65000"/>
+            <a:lumOff val="35000"/>
+          </a:schemeClr>
+        </a:solidFill>
+        <a:round/>
+      </a:ln>
+    </cs:spPr>
+  </cs:errorBar>
+  <cs:floor>
+    <cs:lnRef idx="0"/>
+    <cs:fillRef idx="0"/>
+    <cs:effectRef idx="0"/>
+    <cs:fontRef idx="minor">
+      <a:schemeClr val="tx1"/>
+    </cs:fontRef>
+    <cs:spPr>
+      <a:noFill/>
+      <a:ln>
+        <a:noFill/>
+      </a:ln>
+    </cs:spPr>
+  </cs:floor>
+  <cs:gridlineMajor>
+    <cs:lnRef idx="0"/>
+    <cs:fillRef idx="0"/>
+    <cs:effectRef idx="0"/>
+    <cs:fontRef idx="minor">
+      <a:schemeClr val="tx1"/>
+    </cs:fontRef>
+    <cs:spPr>
+      <a:ln w="9525" cap="flat" cmpd="sng" algn="ctr">
+        <a:solidFill>
+          <a:schemeClr val="tx1">
+            <a:lumMod val="15000"/>
+            <a:lumOff val="85000"/>
+          </a:schemeClr>
+        </a:solidFill>
+        <a:round/>
+      </a:ln>
+    </cs:spPr>
+  </cs:gridlineMajor>
+  <cs:gridlineMinor>
+    <cs:lnRef idx="0"/>
+    <cs:fillRef idx="0"/>
+    <cs:effectRef idx="0"/>
+    <cs:fontRef idx="minor">
+      <a:schemeClr val="tx1"/>
+    </cs:fontRef>
+    <cs:spPr>
+      <a:ln w="9525" cap="flat" cmpd="sng" algn="ctr">
+        <a:solidFill>
+          <a:schemeClr val="tx1">
+            <a:lumMod val="5000"/>
+            <a:lumOff val="95000"/>
+          </a:schemeClr>
+        </a:solidFill>
+        <a:round/>
+      </a:ln>
+    </cs:spPr>
+  </cs:gridlineMinor>
+  <cs:hiLoLine>
+    <cs:lnRef idx="0"/>
+    <cs:fillRef idx="0"/>
+    <cs:effectRef idx="0"/>
+    <cs:fontRef idx="minor">
+      <a:schemeClr val="tx1"/>
+    </cs:fontRef>
+    <cs:spPr>
+      <a:ln w="9525" cap="flat" cmpd="sng" algn="ctr">
+        <a:solidFill>
+          <a:schemeClr val="tx1">
+            <a:lumMod val="50000"/>
+            <a:lumOff val="50000"/>
+          </a:schemeClr>
+        </a:solidFill>
+        <a:round/>
+      </a:ln>
+    </cs:spPr>
+  </cs:hiLoLine>
+  <cs:leaderLine>
+    <cs:lnRef idx="0"/>
+    <cs:fillRef idx="0"/>
+    <cs:effectRef idx="0"/>
+    <cs:fontRef idx="minor">
+      <a:schemeClr val="tx1"/>
+    </cs:fontRef>
+    <cs:spPr>
+      <a:ln w="9525" cap="flat" cmpd="sng" algn="ctr">
+        <a:solidFill>
+          <a:schemeClr val="tx1">
+            <a:lumMod val="35000"/>
+            <a:lumOff val="65000"/>
+          </a:schemeClr>
+        </a:solidFill>
+        <a:round/>
+      </a:ln>
+    </cs:spPr>
+  </cs:leaderLine>
+  <cs:legend>
+    <cs:lnRef idx="0"/>
+    <cs:fillRef idx="0"/>
+    <cs:effectRef idx="0"/>
+    <cs:fontRef idx="minor">
+      <a:schemeClr val="tx1">
+        <a:lumMod val="65000"/>
+        <a:lumOff val="35000"/>
+      </a:schemeClr>
+    </cs:fontRef>
+    <cs:defRPr sz="900" kern="1200"/>
+  </cs:legend>
+  <cs:plotArea mods="allowNoFillOverride allowNoLineOverride">
+    <cs:lnRef idx="0"/>
+    <cs:fillRef idx="0"/>
+    <cs:effectRef idx="0"/>
+    <cs:fontRef idx="minor">
+      <a:schemeClr val="tx1"/>
+    </cs:fontRef>
+  </cs:plotArea>
+  <cs:plotArea3D mods="allowNoFillOverride allowNoLineOverride">
+    <cs:lnRef idx="0"/>
+    <cs:fillRef idx="0"/>
+    <cs:effectRef idx="0"/>
+    <cs:fontRef idx="minor">
+      <a:schemeClr val="tx1"/>
+    </cs:fontRef>
+  </cs:plotArea3D>
+  <cs:seriesAxis>
+    <cs:lnRef idx="0"/>
+    <cs:fillRef idx="0"/>
+    <cs:effectRef idx="0"/>
+    <cs:fontRef idx="minor">
+      <a:schemeClr val="tx1">
+        <a:lumMod val="65000"/>
+        <a:lumOff val="35000"/>
+      </a:schemeClr>
+    </cs:fontRef>
+    <cs:defRPr sz="900" kern="1200"/>
+  </cs:seriesAxis>
+  <cs:seriesLine>
+    <cs:lnRef idx="0"/>
+    <cs:fillRef idx="0"/>
+    <cs:effectRef idx="0"/>
+    <cs:fontRef idx="minor">
+      <a:schemeClr val="tx1"/>
+    </cs:fontRef>
+    <cs:spPr>
+      <a:ln w="9525" cap="flat" cmpd="sng" algn="ctr">
+        <a:solidFill>
+          <a:schemeClr val="tx1">
+            <a:lumMod val="35000"/>
+            <a:lumOff val="65000"/>
+          </a:schemeClr>
+        </a:solidFill>
+        <a:round/>
+      </a:ln>
+    </cs:spPr>
+  </cs:seriesLine>
+  <cs:title>
+    <cs:lnRef idx="0"/>
+    <cs:fillRef idx="0"/>
+    <cs:effectRef idx="0"/>
+    <cs:fontRef idx="minor">
+      <a:schemeClr val="tx1">
+        <a:lumMod val="65000"/>
+        <a:lumOff val="35000"/>
+      </a:schemeClr>
+    </cs:fontRef>
+    <cs:defRPr sz="1400" b="0" kern="1200" spc="0" baseline="0"/>
+  </cs:title>
+  <cs:trendline>
+    <cs:lnRef idx="0">
+      <cs:styleClr val="auto"/>
+    </cs:lnRef>
+    <cs:fillRef idx="0"/>
+    <cs:effectRef idx="0"/>
+    <cs:fontRef idx="minor">
+      <a:schemeClr val="tx1"/>
+    </cs:fontRef>
+    <cs:spPr>
+      <a:ln w="19050" cap="rnd">
+        <a:solidFill>
+          <a:schemeClr val="phClr"/>
+        </a:solidFill>
+        <a:prstDash val="sysDot"/>
+      </a:ln>
+    </cs:spPr>
+  </cs:trendline>
+  <cs:trendlineLabel>
+    <cs:lnRef idx="0"/>
+    <cs:fillRef idx="0"/>
+    <cs:effectRef idx="0"/>
+    <cs:fontRef idx="minor">
+      <a:schemeClr val="tx1">
+        <a:lumMod val="65000"/>
+        <a:lumOff val="35000"/>
+      </a:schemeClr>
+    </cs:fontRef>
+    <cs:defRPr sz="900" kern="1200"/>
+  </cs:trendlineLabel>
+  <cs:upBar>
+    <cs:lnRef idx="0"/>
+    <cs:fillRef idx="0"/>
+    <cs:effectRef idx="0"/>
+    <cs:fontRef idx="minor">
+      <a:schemeClr val="tx1"/>
+    </cs:fontRef>
+    <cs:spPr>
+      <a:solidFill>
+        <a:schemeClr val="lt1"/>
+      </a:solidFill>
+      <a:ln w="9525" cap="flat" cmpd="sng" algn="ctr">
+        <a:solidFill>
+          <a:schemeClr val="tx1">
+            <a:lumMod val="65000"/>
+            <a:lumOff val="35000"/>
+          </a:schemeClr>
+        </a:solidFill>
+        <a:round/>
+      </a:ln>
+    </cs:spPr>
+  </cs:upBar>
+  <cs:valueAxis>
+    <cs:lnRef idx="0"/>
+    <cs:fillRef idx="0"/>
+    <cs:effectRef idx="0"/>
+    <cs:fontRef idx="minor">
+      <a:schemeClr val="tx1">
+        <a:lumMod val="65000"/>
+        <a:lumOff val="35000"/>
+      </a:schemeClr>
+    </cs:fontRef>
+    <cs:defRPr sz="900" kern="1200"/>
+  </cs:valueAxis>
+  <cs:wall>
+    <cs:lnRef idx="0"/>
+    <cs:fillRef idx="0"/>
+    <cs:effectRef idx="0"/>
+    <cs:fontRef idx="minor">
+      <a:schemeClr val="tx1"/>
+    </cs:fontRef>
+    <cs:spPr>
+      <a:noFill/>
+      <a:ln>
+        <a:noFill/>
+      </a:ln>
+    </cs:spPr>
+  </cs:wall>
+</cs:chartStyle>
+</file>
+
+<file path=ppt/charts/style2.xml><?xml version="1.0" encoding="utf-8"?>
+<cs:chartStyle xmlns:cs="http://schemas.microsoft.com/office/drawing/2012/chartStyle" xmlns:a="http://schemas.openxmlformats.org/drawingml/2006/main" id="317">
+  <cs:axisTitle>
+    <cs:lnRef idx="0"/>
+    <cs:fillRef idx="0"/>
+    <cs:effectRef idx="0"/>
+    <cs:fontRef idx="minor">
+      <a:schemeClr val="tx1">
+        <a:lumMod val="65000"/>
+        <a:lumOff val="35000"/>
+      </a:schemeClr>
+    </cs:fontRef>
+    <cs:defRPr sz="1000" kern="1200"/>
+  </cs:axisTitle>
+  <cs:categoryAxis>
+    <cs:lnRef idx="0"/>
+    <cs:fillRef idx="0"/>
+    <cs:effectRef idx="0"/>
+    <cs:fontRef idx="minor">
+      <a:schemeClr val="tx1">
+        <a:lumMod val="65000"/>
+        <a:lumOff val="35000"/>
+      </a:schemeClr>
+    </cs:fontRef>
+    <cs:spPr>
+      <a:ln w="9525" cap="flat" cmpd="sng" algn="ctr">
+        <a:solidFill>
+          <a:schemeClr val="tx1">
+            <a:lumMod val="15000"/>
+            <a:lumOff val="85000"/>
+          </a:schemeClr>
+        </a:solidFill>
+        <a:round/>
+      </a:ln>
+    </cs:spPr>
+    <cs:defRPr sz="900" kern="1200"/>
+  </cs:categoryAxis>
+  <cs:chartArea mods="allowNoFillOverride allowNoLineOverride">
+    <cs:lnRef idx="0"/>
+    <cs:fillRef idx="0"/>
+    <cs:effectRef idx="0"/>
+    <cs:fontRef idx="minor">
+      <a:schemeClr val="tx1"/>
+    </cs:fontRef>
+    <cs:spPr>
+      <a:solidFill>
+        <a:schemeClr val="bg1"/>
+      </a:solidFill>
+      <a:ln w="9525" cap="flat" cmpd="sng" algn="ctr">
+        <a:solidFill>
+          <a:schemeClr val="tx1">
+            <a:lumMod val="15000"/>
+            <a:lumOff val="85000"/>
+          </a:schemeClr>
+        </a:solidFill>
+        <a:round/>
+      </a:ln>
+    </cs:spPr>
+    <cs:defRPr sz="1000" kern="1200"/>
+  </cs:chartArea>
+  <cs:dataLabel>
+    <cs:lnRef idx="0"/>
+    <cs:fillRef idx="0"/>
+    <cs:effectRef idx="0"/>
+    <cs:fontRef idx="minor">
+      <a:schemeClr val="tx1">
+        <a:lumMod val="75000"/>
+        <a:lumOff val="25000"/>
+      </a:schemeClr>
+    </cs:fontRef>
+    <cs:defRPr sz="900" kern="1200"/>
+  </cs:dataLabel>
+  <cs:dataLabelCallout>
+    <cs:lnRef idx="0"/>
+    <cs:fillRef idx="0"/>
+    <cs:effectRef idx="0"/>
+    <cs:fontRef idx="minor">
+      <a:schemeClr val="dk1">
+        <a:lumMod val="65000"/>
+        <a:lumOff val="35000"/>
+      </a:schemeClr>
+    </cs:fontRef>
+    <cs:spPr>
+      <a:solidFill>
+        <a:schemeClr val="lt1"/>
+      </a:solidFill>
+      <a:ln>
+        <a:solidFill>
+          <a:schemeClr val="dk1">
+            <a:lumMod val="25000"/>
+            <a:lumOff val="75000"/>
+          </a:schemeClr>
+        </a:solidFill>
+      </a:ln>
+    </cs:spPr>
+    <cs:defRPr sz="900" kern="1200"/>
+    <cs:bodyPr rot="0" spcFirstLastPara="1" vertOverflow="clip" horzOverflow="clip" vert="horz" wrap="square" lIns="36576" tIns="18288" rIns="36576" bIns="18288" anchor="ctr" anchorCtr="1">
+      <a:spAutoFit/>
+    </cs:bodyPr>
+  </cs:dataLabelCallout>
+  <cs:dataPoint>
+    <cs:lnRef idx="0"/>
+    <cs:fillRef idx="1">
+      <cs:styleClr val="auto"/>
+    </cs:fillRef>
+    <cs:effectRef idx="0"/>
+    <cs:fontRef idx="minor">
+      <a:schemeClr val="tx1"/>
+    </cs:fontRef>
+  </cs:dataPoint>
+  <cs:dataPoint3D>
+    <cs:lnRef idx="0"/>
+    <cs:fillRef idx="1">
+      <cs:styleClr val="auto"/>
+    </cs:fillRef>
+    <cs:effectRef idx="0"/>
+    <cs:fontRef idx="minor">
+      <a:schemeClr val="tx1"/>
+    </cs:fontRef>
+  </cs:dataPoint3D>
+  <cs:dataPointLine>
+    <cs:lnRef idx="0">
+      <cs:styleClr val="auto"/>
+    </cs:lnRef>
+    <cs:fillRef idx="1"/>
+    <cs:effectRef idx="0"/>
+    <cs:fontRef idx="minor">
+      <a:schemeClr val="tx1"/>
+    </cs:fontRef>
+    <cs:spPr>
+      <a:ln w="28575" cap="rnd">
+        <a:solidFill>
+          <a:schemeClr val="phClr"/>
+        </a:solidFill>
+        <a:round/>
+      </a:ln>
+    </cs:spPr>
+  </cs:dataPointLine>
+  <cs:dataPointMarker>
+    <cs:lnRef idx="0">
+      <cs:styleClr val="auto"/>
+    </cs:lnRef>
+    <cs:fillRef idx="1">
+      <cs:styleClr val="auto"/>
+    </cs:fillRef>
+    <cs:effectRef idx="0"/>
+    <cs:fontRef idx="minor">
+      <a:schemeClr val="tx1"/>
+    </cs:fontRef>
+    <cs:spPr>
+      <a:ln w="9525">
+        <a:solidFill>
+          <a:schemeClr val="phClr"/>
+        </a:solidFill>
+      </a:ln>
+    </cs:spPr>
+  </cs:dataPointMarker>
+  <cs:dataPointMarkerLayout symbol="circle" size="5"/>
+  <cs:dataPointWireframe>
+    <cs:lnRef idx="0">
+      <cs:styleClr val="auto"/>
+    </cs:lnRef>
+    <cs:fillRef idx="1"/>
+    <cs:effectRef idx="0"/>
+    <cs:fontRef idx="minor">
+      <a:schemeClr val="tx1"/>
+    </cs:fontRef>
+    <cs:spPr>
+      <a:ln w="9525" cap="rnd">
+        <a:solidFill>
+          <a:schemeClr val="phClr"/>
+        </a:solidFill>
+        <a:round/>
+      </a:ln>
+    </cs:spPr>
+  </cs:dataPointWireframe>
+  <cs:dataTable>
+    <cs:lnRef idx="0"/>
+    <cs:fillRef idx="0"/>
+    <cs:effectRef idx="0"/>
+    <cs:fontRef idx="minor">
+      <a:schemeClr val="tx1">
+        <a:lumMod val="65000"/>
+        <a:lumOff val="35000"/>
+      </a:schemeClr>
+    </cs:fontRef>
+    <cs:spPr>
+      <a:noFill/>
+      <a:ln w="9525" cap="flat" cmpd="sng" algn="ctr">
+        <a:solidFill>
+          <a:schemeClr val="tx1">
+            <a:lumMod val="15000"/>
+            <a:lumOff val="85000"/>
+          </a:schemeClr>
+        </a:solidFill>
+        <a:round/>
+      </a:ln>
+    </cs:spPr>
+    <cs:defRPr sz="900" kern="1200"/>
+  </cs:dataTable>
+  <cs:downBar>
+    <cs:lnRef idx="0"/>
+    <cs:fillRef idx="0"/>
+    <cs:effectRef idx="0"/>
+    <cs:fontRef idx="minor">
+      <a:schemeClr val="tx1"/>
+    </cs:fontRef>
+    <cs:spPr>
+      <a:solidFill>
+        <a:schemeClr val="dk1">
+          <a:lumMod val="75000"/>
+          <a:lumOff val="25000"/>
+        </a:schemeClr>
+      </a:solidFill>
+      <a:ln w="9525" cap="flat" cmpd="sng" algn="ctr">
+        <a:solidFill>
+          <a:schemeClr val="tx1">
+            <a:lumMod val="65000"/>
+            <a:lumOff val="35000"/>
+          </a:schemeClr>
+        </a:solidFill>
+        <a:round/>
+      </a:ln>
+    </cs:spPr>
+  </cs:downBar>
+  <cs:dropLine>
+    <cs:lnRef idx="0"/>
+    <cs:fillRef idx="0"/>
+    <cs:effectRef idx="0"/>
+    <cs:fontRef idx="minor">
+      <a:schemeClr val="tx1"/>
+    </cs:fontRef>
+    <cs:spPr>
+      <a:ln w="9525" cap="flat" cmpd="sng" algn="ctr">
+        <a:solidFill>
+          <a:schemeClr val="tx1">
+            <a:lumMod val="35000"/>
+            <a:lumOff val="65000"/>
+          </a:schemeClr>
+        </a:solidFill>
+        <a:round/>
+      </a:ln>
+    </cs:spPr>
+  </cs:dropLine>
+  <cs:errorBar>
+    <cs:lnRef idx="0"/>
+    <cs:fillRef idx="0"/>
+    <cs:effectRef idx="0"/>
+    <cs:fontRef idx="minor">
+      <a:schemeClr val="tx1"/>
+    </cs:fontRef>
+    <cs:spPr>
+      <a:ln w="9525" cap="flat" cmpd="sng" algn="ctr">
+        <a:solidFill>
+          <a:schemeClr val="tx1">
+            <a:lumMod val="65000"/>
+            <a:lumOff val="35000"/>
+          </a:schemeClr>
+        </a:solidFill>
+        <a:round/>
+      </a:ln>
+    </cs:spPr>
+  </cs:errorBar>
+  <cs:floor>
+    <cs:lnRef idx="0"/>
+    <cs:fillRef idx="0"/>
+    <cs:effectRef idx="0"/>
+    <cs:fontRef idx="minor">
+      <a:schemeClr val="tx1"/>
+    </cs:fontRef>
+    <cs:spPr>
+      <a:noFill/>
+      <a:ln>
+        <a:noFill/>
+      </a:ln>
+    </cs:spPr>
+  </cs:floor>
+  <cs:gridlineMajor>
+    <cs:lnRef idx="0"/>
+    <cs:fillRef idx="0"/>
+    <cs:effectRef idx="0"/>
+    <cs:fontRef idx="minor">
+      <a:schemeClr val="tx1"/>
+    </cs:fontRef>
+    <cs:spPr>
+      <a:ln w="9525" cap="flat" cmpd="sng" algn="ctr">
+        <a:solidFill>
+          <a:schemeClr val="tx1">
+            <a:lumMod val="15000"/>
+            <a:lumOff val="85000"/>
+          </a:schemeClr>
+        </a:solidFill>
+        <a:round/>
+      </a:ln>
+    </cs:spPr>
+  </cs:gridlineMajor>
+  <cs:gridlineMinor>
+    <cs:lnRef idx="0"/>
+    <cs:fillRef idx="0"/>
+    <cs:effectRef idx="0"/>
+    <cs:fontRef idx="minor">
+      <a:schemeClr val="tx1"/>
+    </cs:fontRef>
+    <cs:spPr>
+      <a:ln w="9525" cap="flat" cmpd="sng" algn="ctr">
+        <a:solidFill>
+          <a:schemeClr val="tx1">
+            <a:lumMod val="5000"/>
+            <a:lumOff val="95000"/>
+          </a:schemeClr>
+        </a:solidFill>
+        <a:round/>
+      </a:ln>
+    </cs:spPr>
+  </cs:gridlineMinor>
+  <cs:hiLoLine>
+    <cs:lnRef idx="0"/>
+    <cs:fillRef idx="0"/>
+    <cs:effectRef idx="0"/>
+    <cs:fontRef idx="minor">
+      <a:schemeClr val="tx1"/>
+    </cs:fontRef>
+    <cs:spPr>
+      <a:ln w="9525" cap="flat" cmpd="sng" algn="ctr">
+        <a:solidFill>
+          <a:schemeClr val="tx1">
+            <a:lumMod val="50000"/>
+            <a:lumOff val="50000"/>
+          </a:schemeClr>
+        </a:solidFill>
+        <a:round/>
+      </a:ln>
+    </cs:spPr>
+  </cs:hiLoLine>
+  <cs:leaderLine>
+    <cs:lnRef idx="0"/>
+    <cs:fillRef idx="0"/>
+    <cs:effectRef idx="0"/>
+    <cs:fontRef idx="minor">
+      <a:schemeClr val="tx1"/>
+    </cs:fontRef>
+    <cs:spPr>
+      <a:ln w="9525" cap="flat" cmpd="sng" algn="ctr">
+        <a:solidFill>
+          <a:schemeClr val="tx1">
+            <a:lumMod val="35000"/>
+            <a:lumOff val="65000"/>
+          </a:schemeClr>
+        </a:solidFill>
+        <a:round/>
+      </a:ln>
+    </cs:spPr>
+  </cs:leaderLine>
+  <cs:legend>
+    <cs:lnRef idx="0"/>
+    <cs:fillRef idx="0"/>
+    <cs:effectRef idx="0"/>
+    <cs:fontRef idx="minor">
+      <a:schemeClr val="tx1">
+        <a:lumMod val="65000"/>
+        <a:lumOff val="35000"/>
+      </a:schemeClr>
+    </cs:fontRef>
+    <cs:defRPr sz="900" kern="1200"/>
+  </cs:legend>
+  <cs:plotArea mods="allowNoFillOverride allowNoLineOverride">
+    <cs:lnRef idx="0"/>
+    <cs:fillRef idx="0"/>
+    <cs:effectRef idx="0"/>
+    <cs:fontRef idx="minor">
+      <a:schemeClr val="tx1"/>
+    </cs:fontRef>
+  </cs:plotArea>
+  <cs:plotArea3D mods="allowNoFillOverride allowNoLineOverride">
+    <cs:lnRef idx="0"/>
+    <cs:fillRef idx="0"/>
+    <cs:effectRef idx="0"/>
+    <cs:fontRef idx="minor">
+      <a:schemeClr val="tx1"/>
+    </cs:fontRef>
+  </cs:plotArea3D>
+  <cs:seriesAxis>
+    <cs:lnRef idx="0"/>
+    <cs:fillRef idx="0"/>
+    <cs:effectRef idx="0"/>
+    <cs:fontRef idx="minor">
+      <a:schemeClr val="tx1">
+        <a:lumMod val="65000"/>
+        <a:lumOff val="35000"/>
+      </a:schemeClr>
+    </cs:fontRef>
+    <cs:defRPr sz="900" kern="1200"/>
+  </cs:seriesAxis>
+  <cs:seriesLine>
+    <cs:lnRef idx="0"/>
+    <cs:fillRef idx="0"/>
+    <cs:effectRef idx="0"/>
+    <cs:fontRef idx="minor">
+      <a:schemeClr val="tx1"/>
+    </cs:fontRef>
+    <cs:spPr>
+      <a:ln w="9525" cap="flat" cmpd="sng" algn="ctr">
+        <a:solidFill>
+          <a:schemeClr val="tx1">
+            <a:lumMod val="35000"/>
+            <a:lumOff val="65000"/>
+          </a:schemeClr>
+        </a:solidFill>
+        <a:round/>
+      </a:ln>
+    </cs:spPr>
+  </cs:seriesLine>
+  <cs:title>
+    <cs:lnRef idx="0"/>
+    <cs:fillRef idx="0"/>
+    <cs:effectRef idx="0"/>
+    <cs:fontRef idx="minor">
+      <a:schemeClr val="tx1">
+        <a:lumMod val="65000"/>
+        <a:lumOff val="35000"/>
+      </a:schemeClr>
+    </cs:fontRef>
+    <cs:defRPr sz="1400" b="0" kern="1200" spc="0" baseline="0"/>
+  </cs:title>
+  <cs:trendline>
+    <cs:lnRef idx="0">
+      <cs:styleClr val="auto"/>
+    </cs:lnRef>
+    <cs:fillRef idx="0"/>
+    <cs:effectRef idx="0"/>
+    <cs:fontRef idx="minor">
+      <a:schemeClr val="tx1"/>
+    </cs:fontRef>
+    <cs:spPr>
+      <a:ln w="19050" cap="rnd">
+        <a:solidFill>
+          <a:schemeClr val="phClr"/>
+        </a:solidFill>
+        <a:prstDash val="sysDot"/>
+      </a:ln>
+    </cs:spPr>
+  </cs:trendline>
+  <cs:trendlineLabel>
+    <cs:lnRef idx="0"/>
+    <cs:fillRef idx="0"/>
+    <cs:effectRef idx="0"/>
+    <cs:fontRef idx="minor">
+      <a:schemeClr val="tx1">
+        <a:lumMod val="65000"/>
+        <a:lumOff val="35000"/>
+      </a:schemeClr>
+    </cs:fontRef>
+    <cs:defRPr sz="900" kern="1200"/>
+  </cs:trendlineLabel>
+  <cs:upBar>
+    <cs:lnRef idx="0"/>
+    <cs:fillRef idx="0"/>
+    <cs:effectRef idx="0"/>
+    <cs:fontRef idx="minor">
+      <a:schemeClr val="tx1"/>
+    </cs:fontRef>
+    <cs:spPr>
+      <a:solidFill>
+        <a:schemeClr val="lt1"/>
+      </a:solidFill>
+      <a:ln w="9525" cap="flat" cmpd="sng" algn="ctr">
+        <a:solidFill>
+          <a:schemeClr val="tx1">
+            <a:lumMod val="65000"/>
+            <a:lumOff val="35000"/>
+          </a:schemeClr>
+        </a:solidFill>
+        <a:round/>
+      </a:ln>
+    </cs:spPr>
+  </cs:upBar>
+  <cs:valueAxis>
+    <cs:lnRef idx="0"/>
+    <cs:fillRef idx="0"/>
+    <cs:effectRef idx="0"/>
+    <cs:fontRef idx="minor">
+      <a:schemeClr val="tx1">
+        <a:lumMod val="65000"/>
+        <a:lumOff val="35000"/>
+      </a:schemeClr>
+    </cs:fontRef>
+    <cs:defRPr sz="900" kern="1200"/>
+  </cs:valueAxis>
+  <cs:wall>
+    <cs:lnRef idx="0"/>
+    <cs:fillRef idx="0"/>
+    <cs:effectRef idx="0"/>
+    <cs:fontRef idx="minor">
+      <a:schemeClr val="tx1"/>
+    </cs:fontRef>
+    <cs:spPr>
+      <a:noFill/>
+      <a:ln>
+        <a:noFill/>
+      </a:ln>
+    </cs:spPr>
+  </cs:wall>
+</cs:chartStyle>
 </file>
 
 <file path=ppt/slideLayouts/slideLayout1.xml><?xml version="1.0" encoding="utf-8"?>
@@ -4013,30 +5561,6 @@
               <a:rPr lang="en-US" dirty="0"/>
               <a:t>Funding Diagram</a:t>
             </a:r>
-          </a:p>
-        </p:txBody>
-      </p:sp>
-      <p:sp>
-        <p:nvSpPr>
-          <p:cNvPr id="6" name="Text Placeholder 5"/>
-          <p:cNvSpPr>
-            <a:spLocks noGrp="1"/>
-          </p:cNvSpPr>
-          <p:nvPr>
-            <p:ph type="body" sz="quarter" idx="15"/>
-          </p:nvPr>
-        </p:nvSpPr>
-        <p:spPr>
-          <a:xfrm>
-            <a:off x="266699" y="6494510"/>
-            <a:ext cx="11219447" cy="297704"/>
-          </a:xfrm>
-        </p:spPr>
-        <p:txBody>
-          <a:bodyPr/>
-          <a:lstStyle/>
-          <a:p>
-            <a:endParaRPr lang="en-US"/>
           </a:p>
         </p:txBody>
       </p:sp>
@@ -5726,6 +7250,1637 @@
 </p:sld>
 </file>
 
+<file path=ppt/slides/slide2.xml><?xml version="1.0" encoding="utf-8"?>
+<p:sld xmlns:a="http://schemas.openxmlformats.org/drawingml/2006/main" xmlns:r="http://schemas.openxmlformats.org/officeDocument/2006/relationships" xmlns:p="http://schemas.openxmlformats.org/presentationml/2006/main">
+  <p:cSld>
+    <p:spTree>
+      <p:nvGrpSpPr>
+        <p:cNvPr id="1" name=""/>
+        <p:cNvGrpSpPr/>
+        <p:nvPr/>
+      </p:nvGrpSpPr>
+      <p:grpSpPr>
+        <a:xfrm>
+          <a:off x="0" y="0"/>
+          <a:ext cx="0" cy="0"/>
+          <a:chOff x="0" y="0"/>
+          <a:chExt cx="0" cy="0"/>
+        </a:xfrm>
+      </p:grpSpPr>
+      <p:sp>
+        <p:nvSpPr>
+          <p:cNvPr id="2" name="Title 1"/>
+          <p:cNvSpPr>
+            <a:spLocks noGrp="1"/>
+          </p:cNvSpPr>
+          <p:nvPr>
+            <p:ph type="title"/>
+          </p:nvPr>
+        </p:nvSpPr>
+        <p:spPr/>
+        <p:txBody>
+          <a:bodyPr/>
+          <a:lstStyle/>
+          <a:p>
+            <a:r>
+              <a:rPr lang="en-US" dirty="0"/>
+              <a:t>Financing </a:t>
+            </a:r>
+          </a:p>
+        </p:txBody>
+      </p:sp>
+      <p:sp>
+        <p:nvSpPr>
+          <p:cNvPr id="4" name="Content Placeholder 3"/>
+          <p:cNvSpPr>
+            <a:spLocks noGrp="1"/>
+          </p:cNvSpPr>
+          <p:nvPr>
+            <p:ph sz="quarter" idx="13"/>
+          </p:nvPr>
+        </p:nvSpPr>
+        <p:spPr/>
+        <p:txBody>
+          <a:bodyPr/>
+          <a:lstStyle/>
+          <a:p>
+            <a:r>
+              <a:rPr lang="en-US" dirty="0"/>
+              <a:t>Includes research on the left, which leads to a list of 5 suggestions that can be made</a:t>
+            </a:r>
+          </a:p>
+        </p:txBody>
+      </p:sp>
+      <p:sp>
+        <p:nvSpPr>
+          <p:cNvPr id="5" name="Text Placeholder 4"/>
+          <p:cNvSpPr>
+            <a:spLocks noGrp="1"/>
+          </p:cNvSpPr>
+          <p:nvPr>
+            <p:ph type="body" sz="quarter" idx="14"/>
+          </p:nvPr>
+        </p:nvSpPr>
+        <p:spPr/>
+        <p:txBody>
+          <a:bodyPr/>
+          <a:lstStyle/>
+          <a:p>
+            <a:endParaRPr lang="en-US"/>
+          </a:p>
+        </p:txBody>
+      </p:sp>
+      <p:sp>
+        <p:nvSpPr>
+          <p:cNvPr id="6" name="Text Placeholder 5"/>
+          <p:cNvSpPr>
+            <a:spLocks noGrp="1"/>
+          </p:cNvSpPr>
+          <p:nvPr>
+            <p:ph type="body" sz="quarter" idx="15"/>
+          </p:nvPr>
+        </p:nvSpPr>
+        <p:spPr/>
+        <p:txBody>
+          <a:bodyPr/>
+          <a:lstStyle/>
+          <a:p>
+            <a:endParaRPr lang="en-US"/>
+          </a:p>
+        </p:txBody>
+      </p:sp>
+      <p:sp>
+        <p:nvSpPr>
+          <p:cNvPr id="7" name="Text Placeholder 6"/>
+          <p:cNvSpPr>
+            <a:spLocks noGrp="1"/>
+          </p:cNvSpPr>
+          <p:nvPr>
+            <p:ph type="body" sz="quarter" idx="16"/>
+          </p:nvPr>
+        </p:nvSpPr>
+        <p:spPr/>
+        <p:txBody>
+          <a:bodyPr/>
+          <a:lstStyle/>
+          <a:p>
+            <a:endParaRPr lang="en-US"/>
+          </a:p>
+        </p:txBody>
+      </p:sp>
+      <p:grpSp>
+        <p:nvGrpSpPr>
+          <p:cNvPr id="40" name="Group 39"/>
+          <p:cNvGrpSpPr/>
+          <p:nvPr/>
+        </p:nvGrpSpPr>
+        <p:grpSpPr>
+          <a:xfrm>
+            <a:off x="7600950" y="1555289"/>
+            <a:ext cx="4467225" cy="4586069"/>
+            <a:chOff x="7600950" y="1555289"/>
+            <a:chExt cx="4467225" cy="4586069"/>
+          </a:xfrm>
+        </p:grpSpPr>
+        <p:sp>
+          <p:nvSpPr>
+            <p:cNvPr id="9" name="Rectangle 8"/>
+            <p:cNvSpPr/>
+            <p:nvPr/>
+          </p:nvSpPr>
+          <p:spPr>
+            <a:xfrm>
+              <a:off x="7600950" y="1555289"/>
+              <a:ext cx="4331608" cy="333375"/>
+            </a:xfrm>
+            <a:prstGeom prst="rect">
+              <a:avLst/>
+            </a:prstGeom>
+            <a:solidFill>
+              <a:srgbClr val="58575A"/>
+            </a:solidFill>
+            <a:ln>
+              <a:noFill/>
+            </a:ln>
+          </p:spPr>
+          <p:style>
+            <a:lnRef idx="2">
+              <a:schemeClr val="accent1">
+                <a:shade val="50000"/>
+              </a:schemeClr>
+            </a:lnRef>
+            <a:fillRef idx="1">
+              <a:schemeClr val="accent1"/>
+            </a:fillRef>
+            <a:effectRef idx="0">
+              <a:schemeClr val="accent1"/>
+            </a:effectRef>
+            <a:fontRef idx="minor">
+              <a:schemeClr val="lt1"/>
+            </a:fontRef>
+          </p:style>
+          <p:txBody>
+            <a:bodyPr rtlCol="0" anchor="ctr"/>
+            <a:lstStyle/>
+            <a:p>
+              <a:pPr algn="ctr"/>
+              <a:r>
+                <a:rPr lang="en-US" sz="1600" b="1" dirty="0">
+                  <a:latin typeface="Garamond" panose="02020404030301010803" pitchFamily="18" charset="0"/>
+                </a:rPr>
+                <a:t>Summary of Suggestions</a:t>
+              </a:r>
+            </a:p>
+          </p:txBody>
+        </p:sp>
+        <p:grpSp>
+          <p:nvGrpSpPr>
+            <p:cNvPr id="10" name="Group 9"/>
+            <p:cNvGrpSpPr/>
+            <p:nvPr/>
+          </p:nvGrpSpPr>
+          <p:grpSpPr>
+            <a:xfrm>
+              <a:off x="7772397" y="2082077"/>
+              <a:ext cx="428628" cy="3770304"/>
+              <a:chOff x="7867647" y="2150800"/>
+              <a:chExt cx="428628" cy="3770304"/>
+            </a:xfrm>
+          </p:grpSpPr>
+          <p:sp>
+            <p:nvSpPr>
+              <p:cNvPr id="16" name="Rectangle 15"/>
+              <p:cNvSpPr/>
+              <p:nvPr/>
+            </p:nvSpPr>
+            <p:spPr>
+              <a:xfrm>
+                <a:off x="7867650" y="2150800"/>
+                <a:ext cx="428625" cy="428625"/>
+              </a:xfrm>
+              <a:prstGeom prst="rect">
+                <a:avLst/>
+              </a:prstGeom>
+              <a:solidFill>
+                <a:srgbClr val="23A4DA"/>
+              </a:solidFill>
+              <a:ln>
+                <a:noFill/>
+              </a:ln>
+            </p:spPr>
+            <p:style>
+              <a:lnRef idx="2">
+                <a:schemeClr val="accent1">
+                  <a:shade val="50000"/>
+                </a:schemeClr>
+              </a:lnRef>
+              <a:fillRef idx="1">
+                <a:schemeClr val="accent1"/>
+              </a:fillRef>
+              <a:effectRef idx="0">
+                <a:schemeClr val="accent1"/>
+              </a:effectRef>
+              <a:fontRef idx="minor">
+                <a:schemeClr val="lt1"/>
+              </a:fontRef>
+            </p:style>
+            <p:txBody>
+              <a:bodyPr rtlCol="0" anchor="ctr"/>
+              <a:lstStyle/>
+              <a:p>
+                <a:pPr algn="ctr"/>
+                <a:r>
+                  <a:rPr lang="en-US" sz="1600" dirty="0">
+                    <a:latin typeface="Garamond" panose="02020404030301010803" pitchFamily="18" charset="0"/>
+                  </a:rPr>
+                  <a:t>1</a:t>
+                </a:r>
+              </a:p>
+            </p:txBody>
+          </p:sp>
+          <p:cxnSp>
+            <p:nvCxnSpPr>
+              <p:cNvPr id="17" name="Straight Connector 16"/>
+              <p:cNvCxnSpPr>
+                <a:cxnSpLocks/>
+                <a:stCxn id="16" idx="2"/>
+              </p:cNvCxnSpPr>
+              <p:nvPr/>
+            </p:nvCxnSpPr>
+            <p:spPr>
+              <a:xfrm flipH="1">
+                <a:off x="8081962" y="2579425"/>
+                <a:ext cx="1" cy="406308"/>
+              </a:xfrm>
+              <a:prstGeom prst="line">
+                <a:avLst/>
+              </a:prstGeom>
+              <a:ln>
+                <a:solidFill>
+                  <a:srgbClr val="A8AAAD"/>
+                </a:solidFill>
+                <a:prstDash val="lgDash"/>
+              </a:ln>
+            </p:spPr>
+            <p:style>
+              <a:lnRef idx="1">
+                <a:schemeClr val="accent1"/>
+              </a:lnRef>
+              <a:fillRef idx="0">
+                <a:schemeClr val="accent1"/>
+              </a:fillRef>
+              <a:effectRef idx="0">
+                <a:schemeClr val="accent1"/>
+              </a:effectRef>
+              <a:fontRef idx="minor">
+                <a:schemeClr val="tx1"/>
+              </a:fontRef>
+            </p:style>
+          </p:cxnSp>
+          <p:sp>
+            <p:nvSpPr>
+              <p:cNvPr id="18" name="Rectangle 17"/>
+              <p:cNvSpPr/>
+              <p:nvPr/>
+            </p:nvSpPr>
+            <p:spPr>
+              <a:xfrm>
+                <a:off x="7867649" y="3821302"/>
+                <a:ext cx="428625" cy="428625"/>
+              </a:xfrm>
+              <a:prstGeom prst="rect">
+                <a:avLst/>
+              </a:prstGeom>
+              <a:solidFill>
+                <a:srgbClr val="23A4DA"/>
+              </a:solidFill>
+              <a:ln>
+                <a:noFill/>
+              </a:ln>
+            </p:spPr>
+            <p:style>
+              <a:lnRef idx="2">
+                <a:schemeClr val="accent1">
+                  <a:shade val="50000"/>
+                </a:schemeClr>
+              </a:lnRef>
+              <a:fillRef idx="1">
+                <a:schemeClr val="accent1"/>
+              </a:fillRef>
+              <a:effectRef idx="0">
+                <a:schemeClr val="accent1"/>
+              </a:effectRef>
+              <a:fontRef idx="minor">
+                <a:schemeClr val="lt1"/>
+              </a:fontRef>
+            </p:style>
+            <p:txBody>
+              <a:bodyPr rtlCol="0" anchor="ctr"/>
+              <a:lstStyle/>
+              <a:p>
+                <a:pPr algn="ctr"/>
+                <a:r>
+                  <a:rPr lang="en-US" sz="1600" dirty="0">
+                    <a:latin typeface="Garamond" panose="02020404030301010803" pitchFamily="18" charset="0"/>
+                  </a:rPr>
+                  <a:t>3</a:t>
+                </a:r>
+              </a:p>
+            </p:txBody>
+          </p:sp>
+          <p:cxnSp>
+            <p:nvCxnSpPr>
+              <p:cNvPr id="19" name="Straight Connector 18"/>
+              <p:cNvCxnSpPr>
+                <a:stCxn id="18" idx="2"/>
+              </p:cNvCxnSpPr>
+              <p:nvPr/>
+            </p:nvCxnSpPr>
+            <p:spPr>
+              <a:xfrm flipH="1">
+                <a:off x="8081961" y="4249927"/>
+                <a:ext cx="1" cy="406308"/>
+              </a:xfrm>
+              <a:prstGeom prst="line">
+                <a:avLst/>
+              </a:prstGeom>
+              <a:ln>
+                <a:solidFill>
+                  <a:srgbClr val="A8AAAD"/>
+                </a:solidFill>
+                <a:prstDash val="lgDash"/>
+              </a:ln>
+            </p:spPr>
+            <p:style>
+              <a:lnRef idx="1">
+                <a:schemeClr val="accent1"/>
+              </a:lnRef>
+              <a:fillRef idx="0">
+                <a:schemeClr val="accent1"/>
+              </a:fillRef>
+              <a:effectRef idx="0">
+                <a:schemeClr val="accent1"/>
+              </a:effectRef>
+              <a:fontRef idx="minor">
+                <a:schemeClr val="tx1"/>
+              </a:fontRef>
+            </p:style>
+          </p:cxnSp>
+          <p:sp>
+            <p:nvSpPr>
+              <p:cNvPr id="20" name="Rectangle 19"/>
+              <p:cNvSpPr/>
+              <p:nvPr/>
+            </p:nvSpPr>
+            <p:spPr>
+              <a:xfrm>
+                <a:off x="7867648" y="4657546"/>
+                <a:ext cx="428625" cy="428625"/>
+              </a:xfrm>
+              <a:prstGeom prst="rect">
+                <a:avLst/>
+              </a:prstGeom>
+              <a:solidFill>
+                <a:srgbClr val="23A4DA"/>
+              </a:solidFill>
+              <a:ln>
+                <a:noFill/>
+              </a:ln>
+            </p:spPr>
+            <p:style>
+              <a:lnRef idx="2">
+                <a:schemeClr val="accent1">
+                  <a:shade val="50000"/>
+                </a:schemeClr>
+              </a:lnRef>
+              <a:fillRef idx="1">
+                <a:schemeClr val="accent1"/>
+              </a:fillRef>
+              <a:effectRef idx="0">
+                <a:schemeClr val="accent1"/>
+              </a:effectRef>
+              <a:fontRef idx="minor">
+                <a:schemeClr val="lt1"/>
+              </a:fontRef>
+            </p:style>
+            <p:txBody>
+              <a:bodyPr rtlCol="0" anchor="ctr"/>
+              <a:lstStyle/>
+              <a:p>
+                <a:pPr algn="ctr"/>
+                <a:r>
+                  <a:rPr lang="en-US" sz="1600" dirty="0">
+                    <a:latin typeface="Garamond" panose="02020404030301010803" pitchFamily="18" charset="0"/>
+                  </a:rPr>
+                  <a:t>4</a:t>
+                </a:r>
+              </a:p>
+            </p:txBody>
+          </p:sp>
+          <p:cxnSp>
+            <p:nvCxnSpPr>
+              <p:cNvPr id="21" name="Straight Connector 20"/>
+              <p:cNvCxnSpPr>
+                <a:stCxn id="20" idx="2"/>
+              </p:cNvCxnSpPr>
+              <p:nvPr/>
+            </p:nvCxnSpPr>
+            <p:spPr>
+              <a:xfrm flipH="1">
+                <a:off x="8081960" y="5086171"/>
+                <a:ext cx="1" cy="406308"/>
+              </a:xfrm>
+              <a:prstGeom prst="line">
+                <a:avLst/>
+              </a:prstGeom>
+              <a:ln>
+                <a:solidFill>
+                  <a:srgbClr val="A8AAAD"/>
+                </a:solidFill>
+                <a:prstDash val="lgDash"/>
+              </a:ln>
+            </p:spPr>
+            <p:style>
+              <a:lnRef idx="1">
+                <a:schemeClr val="accent1"/>
+              </a:lnRef>
+              <a:fillRef idx="0">
+                <a:schemeClr val="accent1"/>
+              </a:fillRef>
+              <a:effectRef idx="0">
+                <a:schemeClr val="accent1"/>
+              </a:effectRef>
+              <a:fontRef idx="minor">
+                <a:schemeClr val="tx1"/>
+              </a:fontRef>
+            </p:style>
+          </p:cxnSp>
+          <p:sp>
+            <p:nvSpPr>
+              <p:cNvPr id="22" name="Rectangle 21"/>
+              <p:cNvSpPr/>
+              <p:nvPr/>
+            </p:nvSpPr>
+            <p:spPr>
+              <a:xfrm>
+                <a:off x="7867649" y="2986369"/>
+                <a:ext cx="428625" cy="428625"/>
+              </a:xfrm>
+              <a:prstGeom prst="rect">
+                <a:avLst/>
+              </a:prstGeom>
+              <a:solidFill>
+                <a:srgbClr val="23A4DA"/>
+              </a:solidFill>
+              <a:ln>
+                <a:noFill/>
+              </a:ln>
+            </p:spPr>
+            <p:style>
+              <a:lnRef idx="2">
+                <a:schemeClr val="accent1">
+                  <a:shade val="50000"/>
+                </a:schemeClr>
+              </a:lnRef>
+              <a:fillRef idx="1">
+                <a:schemeClr val="accent1"/>
+              </a:fillRef>
+              <a:effectRef idx="0">
+                <a:schemeClr val="accent1"/>
+              </a:effectRef>
+              <a:fontRef idx="minor">
+                <a:schemeClr val="lt1"/>
+              </a:fontRef>
+            </p:style>
+            <p:txBody>
+              <a:bodyPr rtlCol="0" anchor="ctr"/>
+              <a:lstStyle/>
+              <a:p>
+                <a:pPr algn="ctr"/>
+                <a:r>
+                  <a:rPr lang="en-US" sz="1600" dirty="0">
+                    <a:latin typeface="Garamond" panose="02020404030301010803" pitchFamily="18" charset="0"/>
+                  </a:rPr>
+                  <a:t>2</a:t>
+                </a:r>
+              </a:p>
+            </p:txBody>
+          </p:sp>
+          <p:cxnSp>
+            <p:nvCxnSpPr>
+              <p:cNvPr id="23" name="Straight Connector 22"/>
+              <p:cNvCxnSpPr>
+                <a:stCxn id="22" idx="2"/>
+              </p:cNvCxnSpPr>
+              <p:nvPr/>
+            </p:nvCxnSpPr>
+            <p:spPr>
+              <a:xfrm flipH="1">
+                <a:off x="8081961" y="3414994"/>
+                <a:ext cx="1" cy="406308"/>
+              </a:xfrm>
+              <a:prstGeom prst="line">
+                <a:avLst/>
+              </a:prstGeom>
+              <a:ln>
+                <a:solidFill>
+                  <a:srgbClr val="A8AAAD"/>
+                </a:solidFill>
+                <a:prstDash val="lgDash"/>
+              </a:ln>
+            </p:spPr>
+            <p:style>
+              <a:lnRef idx="1">
+                <a:schemeClr val="accent1"/>
+              </a:lnRef>
+              <a:fillRef idx="0">
+                <a:schemeClr val="accent1"/>
+              </a:fillRef>
+              <a:effectRef idx="0">
+                <a:schemeClr val="accent1"/>
+              </a:effectRef>
+              <a:fontRef idx="minor">
+                <a:schemeClr val="tx1"/>
+              </a:fontRef>
+            </p:style>
+          </p:cxnSp>
+          <p:sp>
+            <p:nvSpPr>
+              <p:cNvPr id="24" name="Rectangle 23"/>
+              <p:cNvSpPr/>
+              <p:nvPr/>
+            </p:nvSpPr>
+            <p:spPr>
+              <a:xfrm>
+                <a:off x="7867647" y="5492479"/>
+                <a:ext cx="428625" cy="428625"/>
+              </a:xfrm>
+              <a:prstGeom prst="rect">
+                <a:avLst/>
+              </a:prstGeom>
+              <a:solidFill>
+                <a:srgbClr val="23A4DA"/>
+              </a:solidFill>
+              <a:ln>
+                <a:noFill/>
+              </a:ln>
+            </p:spPr>
+            <p:style>
+              <a:lnRef idx="2">
+                <a:schemeClr val="accent1">
+                  <a:shade val="50000"/>
+                </a:schemeClr>
+              </a:lnRef>
+              <a:fillRef idx="1">
+                <a:schemeClr val="accent1"/>
+              </a:fillRef>
+              <a:effectRef idx="0">
+                <a:schemeClr val="accent1"/>
+              </a:effectRef>
+              <a:fontRef idx="minor">
+                <a:schemeClr val="lt1"/>
+              </a:fontRef>
+            </p:style>
+            <p:txBody>
+              <a:bodyPr rtlCol="0" anchor="ctr"/>
+              <a:lstStyle/>
+              <a:p>
+                <a:pPr algn="ctr"/>
+                <a:r>
+                  <a:rPr lang="en-US" sz="1600" dirty="0">
+                    <a:latin typeface="Garamond" panose="02020404030301010803" pitchFamily="18" charset="0"/>
+                  </a:rPr>
+                  <a:t>5</a:t>
+                </a:r>
+              </a:p>
+            </p:txBody>
+          </p:sp>
+        </p:grpSp>
+        <p:sp>
+          <p:nvSpPr>
+            <p:cNvPr id="11" name="Rectangle 10"/>
+            <p:cNvSpPr/>
+            <p:nvPr/>
+          </p:nvSpPr>
+          <p:spPr>
+            <a:xfrm>
+              <a:off x="8304491" y="5470200"/>
+              <a:ext cx="3628068" cy="671158"/>
+            </a:xfrm>
+            <a:prstGeom prst="rect">
+              <a:avLst/>
+            </a:prstGeom>
+            <a:noFill/>
+            <a:ln>
+              <a:noFill/>
+            </a:ln>
+          </p:spPr>
+          <p:style>
+            <a:lnRef idx="2">
+              <a:schemeClr val="accent1">
+                <a:shade val="50000"/>
+              </a:schemeClr>
+            </a:lnRef>
+            <a:fillRef idx="1">
+              <a:schemeClr val="accent1"/>
+            </a:fillRef>
+            <a:effectRef idx="0">
+              <a:schemeClr val="accent1"/>
+            </a:effectRef>
+            <a:fontRef idx="minor">
+              <a:schemeClr val="lt1"/>
+            </a:fontRef>
+          </p:style>
+          <p:txBody>
+            <a:bodyPr rtlCol="0" anchor="t"/>
+            <a:lstStyle/>
+            <a:p>
+              <a:pPr>
+                <a:lnSpc>
+                  <a:spcPct val="108000"/>
+                </a:lnSpc>
+              </a:pPr>
+              <a:r>
+                <a:rPr lang="en-US" sz="1200" b="1" dirty="0">
+                  <a:solidFill>
+                    <a:srgbClr val="58575A"/>
+                  </a:solidFill>
+                  <a:latin typeface="Garamond" panose="02020404030301010803" pitchFamily="18" charset="0"/>
+                </a:rPr>
+                <a:t>Demo for Video Portion</a:t>
+              </a:r>
+            </a:p>
+            <a:p>
+              <a:pPr>
+                <a:lnSpc>
+                  <a:spcPct val="108000"/>
+                </a:lnSpc>
+              </a:pPr>
+              <a:r>
+                <a:rPr lang="en-US" sz="1050" dirty="0">
+                  <a:solidFill>
+                    <a:srgbClr val="58575A"/>
+                  </a:solidFill>
+                  <a:latin typeface="Garamond" panose="02020404030301010803" pitchFamily="18" charset="0"/>
+                </a:rPr>
+                <a:t>Include a demo to help explain how to use the video portion of the application</a:t>
+              </a:r>
+            </a:p>
+          </p:txBody>
+        </p:sp>
+        <p:sp>
+          <p:nvSpPr>
+            <p:cNvPr id="12" name="Rectangle 11"/>
+            <p:cNvSpPr/>
+            <p:nvPr/>
+          </p:nvSpPr>
+          <p:spPr>
+            <a:xfrm>
+              <a:off x="8304491" y="2128350"/>
+              <a:ext cx="3628068" cy="671158"/>
+            </a:xfrm>
+            <a:prstGeom prst="rect">
+              <a:avLst/>
+            </a:prstGeom>
+            <a:noFill/>
+            <a:ln>
+              <a:noFill/>
+            </a:ln>
+          </p:spPr>
+          <p:style>
+            <a:lnRef idx="2">
+              <a:schemeClr val="accent1">
+                <a:shade val="50000"/>
+              </a:schemeClr>
+            </a:lnRef>
+            <a:fillRef idx="1">
+              <a:schemeClr val="accent1"/>
+            </a:fillRef>
+            <a:effectRef idx="0">
+              <a:schemeClr val="accent1"/>
+            </a:effectRef>
+            <a:fontRef idx="minor">
+              <a:schemeClr val="lt1"/>
+            </a:fontRef>
+          </p:style>
+          <p:txBody>
+            <a:bodyPr rtlCol="0" anchor="t"/>
+            <a:lstStyle/>
+            <a:p>
+              <a:pPr>
+                <a:lnSpc>
+                  <a:spcPct val="108000"/>
+                </a:lnSpc>
+              </a:pPr>
+              <a:r>
+                <a:rPr lang="en-US" sz="1200" b="1" dirty="0">
+                  <a:solidFill>
+                    <a:srgbClr val="5B5A5D"/>
+                  </a:solidFill>
+                  <a:latin typeface="Garamond" panose="02020404030301010803" pitchFamily="18" charset="0"/>
+                </a:rPr>
+                <a:t>User Flow Restructuring</a:t>
+              </a:r>
+            </a:p>
+            <a:p>
+              <a:pPr>
+                <a:lnSpc>
+                  <a:spcPct val="108000"/>
+                </a:lnSpc>
+              </a:pPr>
+              <a:r>
+                <a:rPr lang="en-US" sz="1050" dirty="0">
+                  <a:solidFill>
+                    <a:srgbClr val="5B5A5D"/>
+                  </a:solidFill>
+                  <a:latin typeface="Garamond" panose="02020404030301010803" pitchFamily="18" charset="0"/>
+                </a:rPr>
+                <a:t>Remove the “Capture” step and have the email signup lead into the program pages</a:t>
+              </a:r>
+              <a:endParaRPr lang="en-US" sz="1000" dirty="0">
+                <a:solidFill>
+                  <a:srgbClr val="5B5A5D"/>
+                </a:solidFill>
+                <a:latin typeface="Garamond" panose="02020404030301010803" pitchFamily="18" charset="0"/>
+              </a:endParaRPr>
+            </a:p>
+          </p:txBody>
+        </p:sp>
+        <p:sp>
+          <p:nvSpPr>
+            <p:cNvPr id="13" name="Rectangle 12"/>
+            <p:cNvSpPr/>
+            <p:nvPr/>
+          </p:nvSpPr>
+          <p:spPr>
+            <a:xfrm>
+              <a:off x="8304491" y="2963812"/>
+              <a:ext cx="3763684" cy="671158"/>
+            </a:xfrm>
+            <a:prstGeom prst="rect">
+              <a:avLst/>
+            </a:prstGeom>
+            <a:noFill/>
+            <a:ln>
+              <a:noFill/>
+            </a:ln>
+          </p:spPr>
+          <p:style>
+            <a:lnRef idx="2">
+              <a:schemeClr val="accent1">
+                <a:shade val="50000"/>
+              </a:schemeClr>
+            </a:lnRef>
+            <a:fillRef idx="1">
+              <a:schemeClr val="accent1"/>
+            </a:fillRef>
+            <a:effectRef idx="0">
+              <a:schemeClr val="accent1"/>
+            </a:effectRef>
+            <a:fontRef idx="minor">
+              <a:schemeClr val="lt1"/>
+            </a:fontRef>
+          </p:style>
+          <p:txBody>
+            <a:bodyPr rtlCol="0" anchor="t"/>
+            <a:lstStyle/>
+            <a:p>
+              <a:pPr>
+                <a:lnSpc>
+                  <a:spcPct val="108000"/>
+                </a:lnSpc>
+              </a:pPr>
+              <a:r>
+                <a:rPr lang="en-US" sz="1200" b="1" dirty="0">
+                  <a:solidFill>
+                    <a:srgbClr val="5B5A5D"/>
+                  </a:solidFill>
+                  <a:latin typeface="Garamond" panose="02020404030301010803" pitchFamily="18" charset="0"/>
+                </a:rPr>
+                <a:t>Content Change</a:t>
+              </a:r>
+            </a:p>
+            <a:p>
+              <a:pPr>
+                <a:lnSpc>
+                  <a:spcPct val="108000"/>
+                </a:lnSpc>
+              </a:pPr>
+              <a:r>
+                <a:rPr lang="en-US" sz="1050" dirty="0">
+                  <a:solidFill>
+                    <a:srgbClr val="5B5A5D"/>
+                  </a:solidFill>
+                  <a:latin typeface="Garamond" panose="02020404030301010803" pitchFamily="18" charset="0"/>
+                </a:rPr>
+                <a:t>Add program stats (acceptance rates/job placement data), specify content (improved timeline), and remove typos</a:t>
+              </a:r>
+            </a:p>
+          </p:txBody>
+        </p:sp>
+        <p:sp>
+          <p:nvSpPr>
+            <p:cNvPr id="14" name="Rectangle 13"/>
+            <p:cNvSpPr/>
+            <p:nvPr/>
+          </p:nvSpPr>
+          <p:spPr>
+            <a:xfrm>
+              <a:off x="8310802" y="3799275"/>
+              <a:ext cx="3621756" cy="671158"/>
+            </a:xfrm>
+            <a:prstGeom prst="rect">
+              <a:avLst/>
+            </a:prstGeom>
+            <a:noFill/>
+            <a:ln>
+              <a:noFill/>
+            </a:ln>
+          </p:spPr>
+          <p:style>
+            <a:lnRef idx="2">
+              <a:schemeClr val="accent1">
+                <a:shade val="50000"/>
+              </a:schemeClr>
+            </a:lnRef>
+            <a:fillRef idx="1">
+              <a:schemeClr val="accent1"/>
+            </a:fillRef>
+            <a:effectRef idx="0">
+              <a:schemeClr val="accent1"/>
+            </a:effectRef>
+            <a:fontRef idx="minor">
+              <a:schemeClr val="lt1"/>
+            </a:fontRef>
+          </p:style>
+          <p:txBody>
+            <a:bodyPr rtlCol="0" anchor="t"/>
+            <a:lstStyle/>
+            <a:p>
+              <a:pPr>
+                <a:lnSpc>
+                  <a:spcPct val="108000"/>
+                </a:lnSpc>
+              </a:pPr>
+              <a:r>
+                <a:rPr lang="en-US" sz="1200" b="1" dirty="0">
+                  <a:solidFill>
+                    <a:srgbClr val="5B5A5D"/>
+                  </a:solidFill>
+                  <a:latin typeface="Garamond" panose="02020404030301010803" pitchFamily="18" charset="0"/>
+                </a:rPr>
+                <a:t>Personalization</a:t>
+              </a:r>
+            </a:p>
+            <a:p>
+              <a:pPr>
+                <a:lnSpc>
+                  <a:spcPct val="108000"/>
+                </a:lnSpc>
+              </a:pPr>
+              <a:r>
+                <a:rPr lang="en-US" sz="1050" dirty="0">
+                  <a:solidFill>
+                    <a:srgbClr val="5B5A5D"/>
+                  </a:solidFill>
+                  <a:latin typeface="Garamond" panose="02020404030301010803" pitchFamily="18" charset="0"/>
+                </a:rPr>
+                <a:t>Add descriptive introduction video and standardize expert professional headshots</a:t>
+              </a:r>
+              <a:endParaRPr lang="en-US" sz="1000" dirty="0">
+                <a:solidFill>
+                  <a:srgbClr val="5B5A5D"/>
+                </a:solidFill>
+                <a:latin typeface="Garamond" panose="02020404030301010803" pitchFamily="18" charset="0"/>
+              </a:endParaRPr>
+            </a:p>
+          </p:txBody>
+        </p:sp>
+        <p:sp>
+          <p:nvSpPr>
+            <p:cNvPr id="15" name="Rectangle 14"/>
+            <p:cNvSpPr/>
+            <p:nvPr/>
+          </p:nvSpPr>
+          <p:spPr>
+            <a:xfrm>
+              <a:off x="8304491" y="4634737"/>
+              <a:ext cx="3628068" cy="671158"/>
+            </a:xfrm>
+            <a:prstGeom prst="rect">
+              <a:avLst/>
+            </a:prstGeom>
+            <a:noFill/>
+            <a:ln>
+              <a:noFill/>
+            </a:ln>
+          </p:spPr>
+          <p:style>
+            <a:lnRef idx="2">
+              <a:schemeClr val="accent1">
+                <a:shade val="50000"/>
+              </a:schemeClr>
+            </a:lnRef>
+            <a:fillRef idx="1">
+              <a:schemeClr val="accent1"/>
+            </a:fillRef>
+            <a:effectRef idx="0">
+              <a:schemeClr val="accent1"/>
+            </a:effectRef>
+            <a:fontRef idx="minor">
+              <a:schemeClr val="lt1"/>
+            </a:fontRef>
+          </p:style>
+          <p:txBody>
+            <a:bodyPr rtlCol="0" anchor="t"/>
+            <a:lstStyle/>
+            <a:p>
+              <a:pPr>
+                <a:lnSpc>
+                  <a:spcPct val="108000"/>
+                </a:lnSpc>
+              </a:pPr>
+              <a:r>
+                <a:rPr lang="en-US" sz="1200" b="1" dirty="0">
+                  <a:solidFill>
+                    <a:srgbClr val="5B5A5D"/>
+                  </a:solidFill>
+                  <a:latin typeface="Garamond" panose="02020404030301010803" pitchFamily="18" charset="0"/>
+                </a:rPr>
+                <a:t>Segmented Application</a:t>
+              </a:r>
+            </a:p>
+            <a:p>
+              <a:pPr>
+                <a:lnSpc>
+                  <a:spcPct val="108000"/>
+                </a:lnSpc>
+              </a:pPr>
+              <a:r>
+                <a:rPr lang="en-US" sz="1050" dirty="0">
+                  <a:solidFill>
+                    <a:srgbClr val="5B5A5D"/>
+                  </a:solidFill>
+                  <a:latin typeface="Garamond" panose="02020404030301010803" pitchFamily="18" charset="0"/>
+                </a:rPr>
+                <a:t>Split up application at the intersection between the essay and video portions</a:t>
+              </a:r>
+              <a:endParaRPr lang="en-US" sz="1000" dirty="0">
+                <a:solidFill>
+                  <a:srgbClr val="5B5A5D"/>
+                </a:solidFill>
+                <a:latin typeface="Garamond" panose="02020404030301010803" pitchFamily="18" charset="0"/>
+              </a:endParaRPr>
+            </a:p>
+          </p:txBody>
+        </p:sp>
+      </p:grpSp>
+      <p:sp>
+        <p:nvSpPr>
+          <p:cNvPr id="25" name="Isosceles Triangle 24"/>
+          <p:cNvSpPr/>
+          <p:nvPr/>
+        </p:nvSpPr>
+        <p:spPr>
+          <a:xfrm rot="5400000">
+            <a:off x="4996889" y="3713403"/>
+            <a:ext cx="4587103" cy="268810"/>
+          </a:xfrm>
+          <a:prstGeom prst="triangle">
+            <a:avLst/>
+          </a:prstGeom>
+          <a:solidFill>
+            <a:srgbClr val="A7A9AD"/>
+          </a:solidFill>
+          <a:ln>
+            <a:noFill/>
+          </a:ln>
+        </p:spPr>
+        <p:style>
+          <a:lnRef idx="2">
+            <a:schemeClr val="accent1">
+              <a:shade val="50000"/>
+            </a:schemeClr>
+          </a:lnRef>
+          <a:fillRef idx="1">
+            <a:schemeClr val="accent1"/>
+          </a:fillRef>
+          <a:effectRef idx="0">
+            <a:schemeClr val="accent1"/>
+          </a:effectRef>
+          <a:fontRef idx="minor">
+            <a:schemeClr val="lt1"/>
+          </a:fontRef>
+        </p:style>
+        <p:txBody>
+          <a:bodyPr rtlCol="0" anchor="ctr"/>
+          <a:lstStyle/>
+          <a:p>
+            <a:pPr algn="ctr"/>
+            <a:endParaRPr lang="en-US">
+              <a:latin typeface="Garamond" panose="02020404030301010803" pitchFamily="18" charset="0"/>
+            </a:endParaRPr>
+          </a:p>
+        </p:txBody>
+      </p:sp>
+      <p:grpSp>
+        <p:nvGrpSpPr>
+          <p:cNvPr id="26" name="Group 25"/>
+          <p:cNvGrpSpPr/>
+          <p:nvPr/>
+        </p:nvGrpSpPr>
+        <p:grpSpPr>
+          <a:xfrm>
+            <a:off x="266699" y="1521952"/>
+            <a:ext cx="6600445" cy="4619406"/>
+            <a:chOff x="266695" y="1581150"/>
+            <a:chExt cx="6600445" cy="4619406"/>
+          </a:xfrm>
+        </p:grpSpPr>
+        <p:grpSp>
+          <p:nvGrpSpPr>
+            <p:cNvPr id="27" name="Group 26"/>
+            <p:cNvGrpSpPr/>
+            <p:nvPr/>
+          </p:nvGrpSpPr>
+          <p:grpSpPr>
+            <a:xfrm>
+              <a:off x="3488760" y="1614487"/>
+              <a:ext cx="3378380" cy="333375"/>
+              <a:chOff x="285750" y="1614487"/>
+              <a:chExt cx="3919595" cy="333375"/>
+            </a:xfrm>
+          </p:grpSpPr>
+          <p:cxnSp>
+            <p:nvCxnSpPr>
+              <p:cNvPr id="32" name="Straight Connector 31"/>
+              <p:cNvCxnSpPr/>
+              <p:nvPr/>
+            </p:nvCxnSpPr>
+            <p:spPr>
+              <a:xfrm>
+                <a:off x="285750" y="1781175"/>
+                <a:ext cx="3919595" cy="0"/>
+              </a:xfrm>
+              <a:prstGeom prst="line">
+                <a:avLst/>
+              </a:prstGeom>
+              <a:ln>
+                <a:solidFill>
+                  <a:srgbClr val="A7A9AD"/>
+                </a:solidFill>
+              </a:ln>
+            </p:spPr>
+            <p:style>
+              <a:lnRef idx="1">
+                <a:schemeClr val="accent1"/>
+              </a:lnRef>
+              <a:fillRef idx="0">
+                <a:schemeClr val="accent1"/>
+              </a:fillRef>
+              <a:effectRef idx="0">
+                <a:schemeClr val="accent1"/>
+              </a:effectRef>
+              <a:fontRef idx="minor">
+                <a:schemeClr val="tx1"/>
+              </a:fontRef>
+            </p:style>
+          </p:cxnSp>
+          <p:sp>
+            <p:nvSpPr>
+              <p:cNvPr id="33" name="Rectangle 32"/>
+              <p:cNvSpPr/>
+              <p:nvPr/>
+            </p:nvSpPr>
+            <p:spPr>
+              <a:xfrm>
+                <a:off x="1226790" y="1614487"/>
+                <a:ext cx="2305050" cy="333375"/>
+              </a:xfrm>
+              <a:prstGeom prst="rect">
+                <a:avLst/>
+              </a:prstGeom>
+              <a:solidFill>
+                <a:srgbClr val="58575A"/>
+              </a:solidFill>
+              <a:ln>
+                <a:noFill/>
+              </a:ln>
+            </p:spPr>
+            <p:style>
+              <a:lnRef idx="2">
+                <a:schemeClr val="accent1">
+                  <a:shade val="50000"/>
+                </a:schemeClr>
+              </a:lnRef>
+              <a:fillRef idx="1">
+                <a:schemeClr val="accent1"/>
+              </a:fillRef>
+              <a:effectRef idx="0">
+                <a:schemeClr val="accent1"/>
+              </a:effectRef>
+              <a:fontRef idx="minor">
+                <a:schemeClr val="lt1"/>
+              </a:fontRef>
+            </p:style>
+            <p:txBody>
+              <a:bodyPr rtlCol="0" anchor="ctr"/>
+              <a:lstStyle/>
+              <a:p>
+                <a:pPr algn="ctr"/>
+                <a:r>
+                  <a:rPr lang="en-US" sz="1600" b="1" dirty="0">
+                    <a:latin typeface="Garamond" panose="02020404030301010803" pitchFamily="18" charset="0"/>
+                  </a:rPr>
+                  <a:t>Secondary</a:t>
+                </a:r>
+              </a:p>
+            </p:txBody>
+          </p:sp>
+        </p:grpSp>
+        <p:cxnSp>
+          <p:nvCxnSpPr>
+            <p:cNvPr id="28" name="Straight Connector 27"/>
+            <p:cNvCxnSpPr/>
+            <p:nvPr/>
+          </p:nvCxnSpPr>
+          <p:spPr>
+            <a:xfrm flipH="1">
+              <a:off x="3535732" y="1581150"/>
+              <a:ext cx="0" cy="4619406"/>
+            </a:xfrm>
+            <a:prstGeom prst="line">
+              <a:avLst/>
+            </a:prstGeom>
+            <a:ln>
+              <a:solidFill>
+                <a:srgbClr val="A7A9AD"/>
+              </a:solidFill>
+            </a:ln>
+          </p:spPr>
+          <p:style>
+            <a:lnRef idx="1">
+              <a:schemeClr val="accent1"/>
+            </a:lnRef>
+            <a:fillRef idx="0">
+              <a:schemeClr val="accent1"/>
+            </a:fillRef>
+            <a:effectRef idx="0">
+              <a:schemeClr val="accent1"/>
+            </a:effectRef>
+            <a:fontRef idx="minor">
+              <a:schemeClr val="tx1"/>
+            </a:fontRef>
+          </p:style>
+        </p:cxnSp>
+        <p:grpSp>
+          <p:nvGrpSpPr>
+            <p:cNvPr id="29" name="Group 28"/>
+            <p:cNvGrpSpPr/>
+            <p:nvPr/>
+          </p:nvGrpSpPr>
+          <p:grpSpPr>
+            <a:xfrm>
+              <a:off x="266695" y="1614487"/>
+              <a:ext cx="3378380" cy="333375"/>
+              <a:chOff x="4205345" y="1614487"/>
+              <a:chExt cx="3919595" cy="333375"/>
+            </a:xfrm>
+          </p:grpSpPr>
+          <p:cxnSp>
+            <p:nvCxnSpPr>
+              <p:cNvPr id="30" name="Straight Connector 29"/>
+              <p:cNvCxnSpPr/>
+              <p:nvPr/>
+            </p:nvCxnSpPr>
+            <p:spPr>
+              <a:xfrm>
+                <a:off x="4205345" y="1781175"/>
+                <a:ext cx="3919595" cy="0"/>
+              </a:xfrm>
+              <a:prstGeom prst="line">
+                <a:avLst/>
+              </a:prstGeom>
+              <a:ln>
+                <a:solidFill>
+                  <a:srgbClr val="A7A9AD"/>
+                </a:solidFill>
+              </a:ln>
+            </p:spPr>
+            <p:style>
+              <a:lnRef idx="1">
+                <a:schemeClr val="accent1"/>
+              </a:lnRef>
+              <a:fillRef idx="0">
+                <a:schemeClr val="accent1"/>
+              </a:fillRef>
+              <a:effectRef idx="0">
+                <a:schemeClr val="accent1"/>
+              </a:effectRef>
+              <a:fontRef idx="minor">
+                <a:schemeClr val="tx1"/>
+              </a:fontRef>
+            </p:style>
+          </p:cxnSp>
+          <p:sp>
+            <p:nvSpPr>
+              <p:cNvPr id="31" name="Rectangle 30"/>
+              <p:cNvSpPr/>
+              <p:nvPr/>
+            </p:nvSpPr>
+            <p:spPr>
+              <a:xfrm>
+                <a:off x="4823613" y="1614487"/>
+                <a:ext cx="2305050" cy="333375"/>
+              </a:xfrm>
+              <a:prstGeom prst="rect">
+                <a:avLst/>
+              </a:prstGeom>
+              <a:solidFill>
+                <a:srgbClr val="58575A"/>
+              </a:solidFill>
+              <a:ln>
+                <a:noFill/>
+              </a:ln>
+            </p:spPr>
+            <p:style>
+              <a:lnRef idx="2">
+                <a:schemeClr val="accent1">
+                  <a:shade val="50000"/>
+                </a:schemeClr>
+              </a:lnRef>
+              <a:fillRef idx="1">
+                <a:schemeClr val="accent1"/>
+              </a:fillRef>
+              <a:effectRef idx="0">
+                <a:schemeClr val="accent1"/>
+              </a:effectRef>
+              <a:fontRef idx="minor">
+                <a:schemeClr val="lt1"/>
+              </a:fontRef>
+            </p:style>
+            <p:txBody>
+              <a:bodyPr rtlCol="0" anchor="ctr"/>
+              <a:lstStyle/>
+              <a:p>
+                <a:pPr algn="ctr"/>
+                <a:r>
+                  <a:rPr lang="en-US" sz="1600" b="1" dirty="0">
+                    <a:latin typeface="Garamond" panose="02020404030301010803" pitchFamily="18" charset="0"/>
+                  </a:rPr>
+                  <a:t>Primary</a:t>
+                </a:r>
+              </a:p>
+            </p:txBody>
+          </p:sp>
+        </p:grpSp>
+      </p:grpSp>
+      <p:graphicFrame>
+        <p:nvGraphicFramePr>
+          <p:cNvPr id="34" name="Chart 33"/>
+          <p:cNvGraphicFramePr>
+            <a:graphicFrameLocks/>
+          </p:cNvGraphicFramePr>
+          <p:nvPr/>
+        </p:nvGraphicFramePr>
+        <p:xfrm>
+          <a:off x="162197" y="1942242"/>
+          <a:ext cx="3279414" cy="2239608"/>
+        </p:xfrm>
+        <a:graphic>
+          <a:graphicData uri="http://schemas.openxmlformats.org/drawingml/2006/chart">
+            <c:chart xmlns:c="http://schemas.openxmlformats.org/drawingml/2006/chart" xmlns:r="http://schemas.openxmlformats.org/officeDocument/2006/relationships" r:id="rId2"/>
+          </a:graphicData>
+        </a:graphic>
+      </p:graphicFrame>
+      <p:graphicFrame>
+        <p:nvGraphicFramePr>
+          <p:cNvPr id="35" name="Chart 34"/>
+          <p:cNvGraphicFramePr>
+            <a:graphicFrameLocks/>
+          </p:cNvGraphicFramePr>
+          <p:nvPr/>
+        </p:nvGraphicFramePr>
+        <p:xfrm>
+          <a:off x="3659027" y="1940549"/>
+          <a:ext cx="3282696" cy="2240280"/>
+        </p:xfrm>
+        <a:graphic>
+          <a:graphicData uri="http://schemas.openxmlformats.org/drawingml/2006/chart">
+            <c:chart xmlns:c="http://schemas.openxmlformats.org/drawingml/2006/chart" xmlns:r="http://schemas.openxmlformats.org/officeDocument/2006/relationships" r:id="rId3"/>
+          </a:graphicData>
+        </a:graphic>
+      </p:graphicFrame>
+      <p:sp>
+        <p:nvSpPr>
+          <p:cNvPr id="36" name="Rectangle 35"/>
+          <p:cNvSpPr/>
+          <p:nvPr/>
+        </p:nvSpPr>
+        <p:spPr>
+          <a:xfrm>
+            <a:off x="3865306" y="5291521"/>
+            <a:ext cx="2855883" cy="803652"/>
+          </a:xfrm>
+          <a:prstGeom prst="rect">
+            <a:avLst/>
+          </a:prstGeom>
+          <a:noFill/>
+          <a:ln>
+            <a:solidFill>
+              <a:srgbClr val="A7A9AD"/>
+            </a:solidFill>
+            <a:prstDash val="lgDash"/>
+          </a:ln>
+        </p:spPr>
+        <p:style>
+          <a:lnRef idx="2">
+            <a:schemeClr val="accent1">
+              <a:shade val="50000"/>
+            </a:schemeClr>
+          </a:lnRef>
+          <a:fillRef idx="1">
+            <a:schemeClr val="accent1"/>
+          </a:fillRef>
+          <a:effectRef idx="0">
+            <a:schemeClr val="accent1"/>
+          </a:effectRef>
+          <a:fontRef idx="minor">
+            <a:schemeClr val="lt1"/>
+          </a:fontRef>
+        </p:style>
+        <p:txBody>
+          <a:bodyPr rtlCol="0" anchor="ctr"/>
+          <a:lstStyle/>
+          <a:p>
+            <a:pPr algn="ctr">
+              <a:lnSpc>
+                <a:spcPct val="107000"/>
+              </a:lnSpc>
+              <a:spcAft>
+                <a:spcPts val="800"/>
+              </a:spcAft>
+            </a:pPr>
+            <a:r>
+              <a:rPr lang="en-US" sz="1050" i="1" dirty="0">
+                <a:solidFill>
+                  <a:srgbClr val="58575A"/>
+                </a:solidFill>
+                <a:latin typeface="Garamond" panose="02020404030301010803" pitchFamily="18" charset="0"/>
+                <a:ea typeface="Calibri" panose="020F0502020204030204" pitchFamily="34" charset="0"/>
+                <a:cs typeface="Times New Roman" panose="02020603050405020304" pitchFamily="18" charset="0"/>
+              </a:rPr>
+              <a:t>“Aside from the video part being glitchy, I had no problems with the app</a:t>
+            </a:r>
+            <a:r>
+              <a:rPr lang="en-US" sz="1050" i="1" dirty="0">
+                <a:solidFill>
+                  <a:srgbClr val="58575A"/>
+                </a:solidFill>
+                <a:latin typeface="Garamond" panose="02020404030301010803" pitchFamily="18" charset="0"/>
+              </a:rPr>
+              <a:t>…”</a:t>
+            </a:r>
+            <a:endParaRPr lang="en-US" sz="1050" dirty="0">
+              <a:solidFill>
+                <a:srgbClr val="58575A"/>
+              </a:solidFill>
+              <a:latin typeface="Garamond" panose="02020404030301010803" pitchFamily="18" charset="0"/>
+              <a:ea typeface="Calibri" panose="020F0502020204030204" pitchFamily="34" charset="0"/>
+              <a:cs typeface="Times New Roman" panose="02020603050405020304" pitchFamily="18" charset="0"/>
+            </a:endParaRPr>
+          </a:p>
+        </p:txBody>
+      </p:sp>
+      <p:sp>
+        <p:nvSpPr>
+          <p:cNvPr id="37" name="Rectangle 36"/>
+          <p:cNvSpPr/>
+          <p:nvPr/>
+        </p:nvSpPr>
+        <p:spPr>
+          <a:xfrm>
+            <a:off x="3865306" y="4334349"/>
+            <a:ext cx="2855883" cy="803652"/>
+          </a:xfrm>
+          <a:prstGeom prst="rect">
+            <a:avLst/>
+          </a:prstGeom>
+          <a:noFill/>
+          <a:ln>
+            <a:solidFill>
+              <a:srgbClr val="A7A9AD"/>
+            </a:solidFill>
+            <a:prstDash val="lgDash"/>
+          </a:ln>
+        </p:spPr>
+        <p:style>
+          <a:lnRef idx="2">
+            <a:schemeClr val="accent1">
+              <a:shade val="50000"/>
+            </a:schemeClr>
+          </a:lnRef>
+          <a:fillRef idx="1">
+            <a:schemeClr val="accent1"/>
+          </a:fillRef>
+          <a:effectRef idx="0">
+            <a:schemeClr val="accent1"/>
+          </a:effectRef>
+          <a:fontRef idx="minor">
+            <a:schemeClr val="lt1"/>
+          </a:fontRef>
+        </p:style>
+        <p:txBody>
+          <a:bodyPr rtlCol="0" anchor="ctr"/>
+          <a:lstStyle/>
+          <a:p>
+            <a:pPr algn="ctr">
+              <a:lnSpc>
+                <a:spcPct val="107000"/>
+              </a:lnSpc>
+              <a:spcAft>
+                <a:spcPts val="800"/>
+              </a:spcAft>
+            </a:pPr>
+            <a:r>
+              <a:rPr lang="en-US" sz="1050" i="1" dirty="0">
+                <a:solidFill>
+                  <a:srgbClr val="58575A"/>
+                </a:solidFill>
+                <a:latin typeface="Garamond" panose="02020404030301010803" pitchFamily="18" charset="0"/>
+                <a:ea typeface="Calibri" panose="020F0502020204030204" pitchFamily="34" charset="0"/>
+                <a:cs typeface="Times New Roman" panose="02020603050405020304" pitchFamily="18" charset="0"/>
+              </a:rPr>
+              <a:t>“The instructions aren’t very clear once you open the video player…”</a:t>
+            </a:r>
+            <a:endParaRPr lang="en-US" sz="1050" dirty="0">
+              <a:solidFill>
+                <a:srgbClr val="58575A"/>
+              </a:solidFill>
+              <a:latin typeface="Garamond" panose="02020404030301010803" pitchFamily="18" charset="0"/>
+              <a:ea typeface="Calibri" panose="020F0502020204030204" pitchFamily="34" charset="0"/>
+              <a:cs typeface="Times New Roman" panose="02020603050405020304" pitchFamily="18" charset="0"/>
+            </a:endParaRPr>
+          </a:p>
+        </p:txBody>
+      </p:sp>
+      <p:sp>
+        <p:nvSpPr>
+          <p:cNvPr id="38" name="Rectangle 37"/>
+          <p:cNvSpPr/>
+          <p:nvPr/>
+        </p:nvSpPr>
+        <p:spPr>
+          <a:xfrm>
+            <a:off x="370105" y="5291521"/>
+            <a:ext cx="2855883" cy="803652"/>
+          </a:xfrm>
+          <a:prstGeom prst="rect">
+            <a:avLst/>
+          </a:prstGeom>
+          <a:noFill/>
+          <a:ln>
+            <a:solidFill>
+              <a:srgbClr val="A7A9AD"/>
+            </a:solidFill>
+            <a:prstDash val="lgDash"/>
+          </a:ln>
+        </p:spPr>
+        <p:style>
+          <a:lnRef idx="2">
+            <a:schemeClr val="accent1">
+              <a:shade val="50000"/>
+            </a:schemeClr>
+          </a:lnRef>
+          <a:fillRef idx="1">
+            <a:schemeClr val="accent1"/>
+          </a:fillRef>
+          <a:effectRef idx="0">
+            <a:schemeClr val="accent1"/>
+          </a:effectRef>
+          <a:fontRef idx="minor">
+            <a:schemeClr val="lt1"/>
+          </a:fontRef>
+        </p:style>
+        <p:txBody>
+          <a:bodyPr rtlCol="0" anchor="ctr"/>
+          <a:lstStyle/>
+          <a:p>
+            <a:pPr algn="ctr">
+              <a:lnSpc>
+                <a:spcPct val="107000"/>
+              </a:lnSpc>
+              <a:spcAft>
+                <a:spcPts val="800"/>
+              </a:spcAft>
+            </a:pPr>
+            <a:r>
+              <a:rPr lang="en-US" sz="1050" i="1" dirty="0">
+                <a:solidFill>
+                  <a:srgbClr val="58575A"/>
+                </a:solidFill>
+                <a:latin typeface="Garamond" panose="02020404030301010803" pitchFamily="18" charset="0"/>
+                <a:ea typeface="Calibri" panose="020F0502020204030204" pitchFamily="34" charset="0"/>
+                <a:cs typeface="Times New Roman" panose="02020603050405020304" pitchFamily="18" charset="0"/>
+              </a:rPr>
+              <a:t>“Why should I have to sign up and receive an email to learn more? …”</a:t>
+            </a:r>
+            <a:endParaRPr lang="en-US" sz="1050" dirty="0">
+              <a:solidFill>
+                <a:srgbClr val="58575A"/>
+              </a:solidFill>
+              <a:latin typeface="Garamond" panose="02020404030301010803" pitchFamily="18" charset="0"/>
+              <a:ea typeface="Calibri" panose="020F0502020204030204" pitchFamily="34" charset="0"/>
+              <a:cs typeface="Times New Roman" panose="02020603050405020304" pitchFamily="18" charset="0"/>
+            </a:endParaRPr>
+          </a:p>
+        </p:txBody>
+      </p:sp>
+      <p:sp>
+        <p:nvSpPr>
+          <p:cNvPr id="39" name="Rectangle 38"/>
+          <p:cNvSpPr/>
+          <p:nvPr/>
+        </p:nvSpPr>
+        <p:spPr>
+          <a:xfrm>
+            <a:off x="370105" y="4334349"/>
+            <a:ext cx="2855883" cy="803652"/>
+          </a:xfrm>
+          <a:prstGeom prst="rect">
+            <a:avLst/>
+          </a:prstGeom>
+          <a:noFill/>
+          <a:ln>
+            <a:solidFill>
+              <a:srgbClr val="A7A9AD"/>
+            </a:solidFill>
+            <a:prstDash val="lgDash"/>
+          </a:ln>
+        </p:spPr>
+        <p:style>
+          <a:lnRef idx="2">
+            <a:schemeClr val="accent1">
+              <a:shade val="50000"/>
+            </a:schemeClr>
+          </a:lnRef>
+          <a:fillRef idx="1">
+            <a:schemeClr val="accent1"/>
+          </a:fillRef>
+          <a:effectRef idx="0">
+            <a:schemeClr val="accent1"/>
+          </a:effectRef>
+          <a:fontRef idx="minor">
+            <a:schemeClr val="lt1"/>
+          </a:fontRef>
+        </p:style>
+        <p:txBody>
+          <a:bodyPr rtlCol="0" anchor="ctr"/>
+          <a:lstStyle/>
+          <a:p>
+            <a:pPr algn="ctr">
+              <a:lnSpc>
+                <a:spcPct val="107000"/>
+              </a:lnSpc>
+              <a:spcAft>
+                <a:spcPts val="800"/>
+              </a:spcAft>
+            </a:pPr>
+            <a:r>
+              <a:rPr lang="en-US" sz="1050" i="1" dirty="0">
+                <a:solidFill>
+                  <a:srgbClr val="58575A"/>
+                </a:solidFill>
+                <a:latin typeface="Garamond" panose="02020404030301010803" pitchFamily="18" charset="0"/>
+                <a:ea typeface="Calibri" panose="020F0502020204030204" pitchFamily="34" charset="0"/>
+                <a:cs typeface="Times New Roman" panose="02020603050405020304" pitchFamily="18" charset="0"/>
+              </a:rPr>
+              <a:t>“Inconsistencies in the website communicates a lack of professionalism… “</a:t>
+            </a:r>
+            <a:endParaRPr lang="en-US" sz="1050" dirty="0">
+              <a:solidFill>
+                <a:srgbClr val="58575A"/>
+              </a:solidFill>
+              <a:latin typeface="Garamond" panose="02020404030301010803" pitchFamily="18" charset="0"/>
+              <a:ea typeface="Calibri" panose="020F0502020204030204" pitchFamily="34" charset="0"/>
+              <a:cs typeface="Times New Roman" panose="02020603050405020304" pitchFamily="18" charset="0"/>
+            </a:endParaRPr>
+          </a:p>
+        </p:txBody>
+      </p:sp>
+    </p:spTree>
+    <p:extLst>
+      <p:ext uri="{BB962C8B-B14F-4D97-AF65-F5344CB8AC3E}">
+        <p14:creationId xmlns:p14="http://schemas.microsoft.com/office/powerpoint/2010/main" val="2086976659"/>
+      </p:ext>
+    </p:extLst>
+  </p:cSld>
+  <p:clrMapOvr>
+    <a:masterClrMapping/>
+  </p:clrMapOvr>
+</p:sld>
+</file>
+
 <file path=ppt/theme/theme1.xml><?xml version="1.0" encoding="utf-8"?>
 <a:theme xmlns:a="http://schemas.openxmlformats.org/drawingml/2006/main" name="Office Theme">
   <a:themeElements>

</xml_diff>